<commit_message>
final edits to presentation
</commit_message>
<xml_diff>
--- a/ETL_Presentation.pptx
+++ b/ETL_Presentation.pptx
@@ -1042,6 +1042,788 @@
 </file>
 
 <file path=ppt/diagrams/colors2.xml><?xml version="1.0" encoding="utf-8"?>
+<dgm:colorsDef xmlns:dgm="http://schemas.openxmlformats.org/drawingml/2006/diagram" xmlns:a="http://schemas.openxmlformats.org/drawingml/2006/main" uniqueId="urn:microsoft.com/office/officeart/2005/8/colors/colorful2">
+  <dgm:title val=""/>
+  <dgm:desc val=""/>
+  <dgm:catLst>
+    <dgm:cat type="colorful" pri="10200"/>
+  </dgm:catLst>
+  <dgm:styleLbl name="node0">
+    <dgm:fillClrLst meth="repeat">
+      <a:schemeClr val="accent1"/>
+    </dgm:fillClrLst>
+    <dgm:linClrLst meth="repeat">
+      <a:schemeClr val="lt1"/>
+    </dgm:linClrLst>
+    <dgm:effectClrLst/>
+    <dgm:txLinClrLst/>
+    <dgm:txFillClrLst/>
+    <dgm:txEffectClrLst/>
+  </dgm:styleLbl>
+  <dgm:styleLbl name="node1">
+    <dgm:fillClrLst>
+      <a:schemeClr val="accent2"/>
+      <a:schemeClr val="accent3"/>
+    </dgm:fillClrLst>
+    <dgm:linClrLst meth="repeat">
+      <a:schemeClr val="lt1"/>
+    </dgm:linClrLst>
+    <dgm:effectClrLst/>
+    <dgm:txLinClrLst/>
+    <dgm:txFillClrLst/>
+    <dgm:txEffectClrLst/>
+  </dgm:styleLbl>
+  <dgm:styleLbl name="alignNode1">
+    <dgm:fillClrLst>
+      <a:schemeClr val="accent2"/>
+      <a:schemeClr val="accent3"/>
+    </dgm:fillClrLst>
+    <dgm:linClrLst>
+      <a:schemeClr val="accent2"/>
+      <a:schemeClr val="accent3"/>
+    </dgm:linClrLst>
+    <dgm:effectClrLst/>
+    <dgm:txLinClrLst/>
+    <dgm:txFillClrLst/>
+    <dgm:txEffectClrLst/>
+  </dgm:styleLbl>
+  <dgm:styleLbl name="lnNode1">
+    <dgm:fillClrLst>
+      <a:schemeClr val="accent2"/>
+      <a:schemeClr val="accent3"/>
+    </dgm:fillClrLst>
+    <dgm:linClrLst meth="repeat">
+      <a:schemeClr val="lt1"/>
+    </dgm:linClrLst>
+    <dgm:effectClrLst/>
+    <dgm:txLinClrLst/>
+    <dgm:txFillClrLst/>
+    <dgm:txEffectClrLst/>
+  </dgm:styleLbl>
+  <dgm:styleLbl name="vennNode1">
+    <dgm:fillClrLst>
+      <a:schemeClr val="accent2">
+        <a:alpha val="50000"/>
+      </a:schemeClr>
+      <a:schemeClr val="accent3">
+        <a:alpha val="50000"/>
+      </a:schemeClr>
+    </dgm:fillClrLst>
+    <dgm:linClrLst meth="repeat">
+      <a:schemeClr val="lt1"/>
+    </dgm:linClrLst>
+    <dgm:effectClrLst/>
+    <dgm:txLinClrLst/>
+    <dgm:txFillClrLst/>
+    <dgm:txEffectClrLst/>
+  </dgm:styleLbl>
+  <dgm:styleLbl name="node2">
+    <dgm:fillClrLst>
+      <a:schemeClr val="accent3"/>
+    </dgm:fillClrLst>
+    <dgm:linClrLst meth="repeat">
+      <a:schemeClr val="lt1"/>
+    </dgm:linClrLst>
+    <dgm:effectClrLst/>
+    <dgm:txLinClrLst/>
+    <dgm:txFillClrLst/>
+    <dgm:txEffectClrLst/>
+  </dgm:styleLbl>
+  <dgm:styleLbl name="node3">
+    <dgm:fillClrLst>
+      <a:schemeClr val="accent4"/>
+    </dgm:fillClrLst>
+    <dgm:linClrLst meth="repeat">
+      <a:schemeClr val="lt1"/>
+    </dgm:linClrLst>
+    <dgm:effectClrLst/>
+    <dgm:txLinClrLst/>
+    <dgm:txFillClrLst/>
+    <dgm:txEffectClrLst/>
+  </dgm:styleLbl>
+  <dgm:styleLbl name="node4">
+    <dgm:fillClrLst>
+      <a:schemeClr val="accent5"/>
+    </dgm:fillClrLst>
+    <dgm:linClrLst meth="repeat">
+      <a:schemeClr val="lt1"/>
+    </dgm:linClrLst>
+    <dgm:effectClrLst/>
+    <dgm:txLinClrLst/>
+    <dgm:txFillClrLst/>
+    <dgm:txEffectClrLst/>
+  </dgm:styleLbl>
+  <dgm:styleLbl name="fgImgPlace1">
+    <dgm:fillClrLst>
+      <a:schemeClr val="accent2">
+        <a:tint val="50000"/>
+      </a:schemeClr>
+      <a:schemeClr val="accent3">
+        <a:tint val="50000"/>
+      </a:schemeClr>
+    </dgm:fillClrLst>
+    <dgm:linClrLst meth="repeat">
+      <a:schemeClr val="lt1"/>
+    </dgm:linClrLst>
+    <dgm:effectClrLst/>
+    <dgm:txLinClrLst/>
+    <dgm:txFillClrLst meth="repeat">
+      <a:schemeClr val="lt1"/>
+    </dgm:txFillClrLst>
+    <dgm:txEffectClrLst/>
+  </dgm:styleLbl>
+  <dgm:styleLbl name="alignImgPlace1">
+    <dgm:fillClrLst>
+      <a:schemeClr val="accent2">
+        <a:tint val="50000"/>
+      </a:schemeClr>
+      <a:schemeClr val="accent3">
+        <a:tint val="20000"/>
+      </a:schemeClr>
+    </dgm:fillClrLst>
+    <dgm:linClrLst meth="repeat">
+      <a:schemeClr val="lt1"/>
+    </dgm:linClrLst>
+    <dgm:effectClrLst/>
+    <dgm:txLinClrLst/>
+    <dgm:txFillClrLst meth="repeat">
+      <a:schemeClr val="lt1"/>
+    </dgm:txFillClrLst>
+    <dgm:txEffectClrLst/>
+  </dgm:styleLbl>
+  <dgm:styleLbl name="bgImgPlace1">
+    <dgm:fillClrLst>
+      <a:schemeClr val="accent2">
+        <a:tint val="50000"/>
+      </a:schemeClr>
+      <a:schemeClr val="accent3">
+        <a:tint val="20000"/>
+      </a:schemeClr>
+    </dgm:fillClrLst>
+    <dgm:linClrLst meth="repeat">
+      <a:schemeClr val="lt1"/>
+    </dgm:linClrLst>
+    <dgm:effectClrLst/>
+    <dgm:txLinClrLst/>
+    <dgm:txFillClrLst meth="repeat">
+      <a:schemeClr val="lt1"/>
+    </dgm:txFillClrLst>
+    <dgm:txEffectClrLst/>
+  </dgm:styleLbl>
+  <dgm:styleLbl name="sibTrans2D1">
+    <dgm:fillClrLst>
+      <a:schemeClr val="accent2"/>
+      <a:schemeClr val="accent3"/>
+    </dgm:fillClrLst>
+    <dgm:linClrLst meth="repeat">
+      <a:schemeClr val="lt1"/>
+    </dgm:linClrLst>
+    <dgm:effectClrLst/>
+    <dgm:txLinClrLst/>
+    <dgm:txFillClrLst/>
+    <dgm:txEffectClrLst/>
+  </dgm:styleLbl>
+  <dgm:styleLbl name="fgSibTrans2D1">
+    <dgm:fillClrLst>
+      <a:schemeClr val="accent2"/>
+      <a:schemeClr val="accent3"/>
+    </dgm:fillClrLst>
+    <dgm:linClrLst meth="repeat">
+      <a:schemeClr val="lt1"/>
+    </dgm:linClrLst>
+    <dgm:effectClrLst/>
+    <dgm:txLinClrLst/>
+    <dgm:txFillClrLst meth="repeat">
+      <a:schemeClr val="lt1"/>
+    </dgm:txFillClrLst>
+    <dgm:txEffectClrLst/>
+  </dgm:styleLbl>
+  <dgm:styleLbl name="bgSibTrans2D1">
+    <dgm:fillClrLst>
+      <a:schemeClr val="accent2"/>
+      <a:schemeClr val="accent3"/>
+    </dgm:fillClrLst>
+    <dgm:linClrLst meth="repeat">
+      <a:schemeClr val="lt1"/>
+    </dgm:linClrLst>
+    <dgm:effectClrLst/>
+    <dgm:txLinClrLst/>
+    <dgm:txFillClrLst meth="repeat">
+      <a:schemeClr val="lt1"/>
+    </dgm:txFillClrLst>
+    <dgm:txEffectClrLst/>
+  </dgm:styleLbl>
+  <dgm:styleLbl name="sibTrans1D1">
+    <dgm:fillClrLst/>
+    <dgm:linClrLst>
+      <a:schemeClr val="accent2"/>
+      <a:schemeClr val="accent3"/>
+    </dgm:linClrLst>
+    <dgm:effectClrLst/>
+    <dgm:txLinClrLst/>
+    <dgm:txFillClrLst meth="repeat">
+      <a:schemeClr val="tx1"/>
+    </dgm:txFillClrLst>
+    <dgm:txEffectClrLst/>
+  </dgm:styleLbl>
+  <dgm:styleLbl name="callout">
+    <dgm:fillClrLst meth="repeat">
+      <a:schemeClr val="accent2"/>
+    </dgm:fillClrLst>
+    <dgm:linClrLst meth="repeat">
+      <a:schemeClr val="accent2">
+        <a:tint val="50000"/>
+      </a:schemeClr>
+    </dgm:linClrLst>
+    <dgm:effectClrLst/>
+    <dgm:txLinClrLst/>
+    <dgm:txFillClrLst meth="repeat">
+      <a:schemeClr val="tx1"/>
+    </dgm:txFillClrLst>
+    <dgm:txEffectClrLst/>
+  </dgm:styleLbl>
+  <dgm:styleLbl name="asst0">
+    <dgm:fillClrLst meth="repeat">
+      <a:schemeClr val="accent2"/>
+    </dgm:fillClrLst>
+    <dgm:linClrLst meth="repeat">
+      <a:schemeClr val="lt1">
+        <a:shade val="80000"/>
+      </a:schemeClr>
+    </dgm:linClrLst>
+    <dgm:effectClrLst/>
+    <dgm:txLinClrLst/>
+    <dgm:txFillClrLst/>
+    <dgm:txEffectClrLst/>
+  </dgm:styleLbl>
+  <dgm:styleLbl name="asst1">
+    <dgm:fillClrLst meth="repeat">
+      <a:schemeClr val="accent3"/>
+    </dgm:fillClrLst>
+    <dgm:linClrLst meth="repeat">
+      <a:schemeClr val="lt1">
+        <a:shade val="80000"/>
+      </a:schemeClr>
+    </dgm:linClrLst>
+    <dgm:effectClrLst/>
+    <dgm:txLinClrLst/>
+    <dgm:txFillClrLst/>
+    <dgm:txEffectClrLst/>
+  </dgm:styleLbl>
+  <dgm:styleLbl name="asst2">
+    <dgm:fillClrLst>
+      <a:schemeClr val="accent4"/>
+    </dgm:fillClrLst>
+    <dgm:linClrLst meth="repeat">
+      <a:schemeClr val="lt1"/>
+    </dgm:linClrLst>
+    <dgm:effectClrLst/>
+    <dgm:txLinClrLst/>
+    <dgm:txFillClrLst/>
+    <dgm:txEffectClrLst/>
+  </dgm:styleLbl>
+  <dgm:styleLbl name="asst3">
+    <dgm:fillClrLst>
+      <a:schemeClr val="accent5"/>
+    </dgm:fillClrLst>
+    <dgm:linClrLst meth="repeat">
+      <a:schemeClr val="lt1"/>
+    </dgm:linClrLst>
+    <dgm:effectClrLst/>
+    <dgm:txLinClrLst/>
+    <dgm:txFillClrLst/>
+    <dgm:txEffectClrLst/>
+  </dgm:styleLbl>
+  <dgm:styleLbl name="asst4">
+    <dgm:fillClrLst>
+      <a:schemeClr val="accent6"/>
+    </dgm:fillClrLst>
+    <dgm:linClrLst meth="repeat">
+      <a:schemeClr val="lt1"/>
+    </dgm:linClrLst>
+    <dgm:effectClrLst/>
+    <dgm:txLinClrLst/>
+    <dgm:txFillClrLst/>
+    <dgm:txEffectClrLst/>
+  </dgm:styleLbl>
+  <dgm:styleLbl name="parChTrans2D1">
+    <dgm:fillClrLst meth="repeat">
+      <a:schemeClr val="accent2"/>
+    </dgm:fillClrLst>
+    <dgm:linClrLst meth="repeat">
+      <a:schemeClr val="lt1"/>
+    </dgm:linClrLst>
+    <dgm:effectClrLst/>
+    <dgm:txLinClrLst/>
+    <dgm:txFillClrLst meth="repeat">
+      <a:schemeClr val="lt1"/>
+    </dgm:txFillClrLst>
+    <dgm:txEffectClrLst/>
+  </dgm:styleLbl>
+  <dgm:styleLbl name="parChTrans2D2">
+    <dgm:fillClrLst meth="repeat">
+      <a:schemeClr val="accent3"/>
+    </dgm:fillClrLst>
+    <dgm:linClrLst meth="repeat">
+      <a:schemeClr val="lt1"/>
+    </dgm:linClrLst>
+    <dgm:effectClrLst/>
+    <dgm:txLinClrLst/>
+    <dgm:txFillClrLst/>
+    <dgm:txEffectClrLst/>
+  </dgm:styleLbl>
+  <dgm:styleLbl name="parChTrans2D3">
+    <dgm:fillClrLst meth="repeat">
+      <a:schemeClr val="accent4"/>
+    </dgm:fillClrLst>
+    <dgm:linClrLst meth="repeat">
+      <a:schemeClr val="lt1"/>
+    </dgm:linClrLst>
+    <dgm:effectClrLst/>
+    <dgm:txLinClrLst/>
+    <dgm:txFillClrLst/>
+    <dgm:txEffectClrLst/>
+  </dgm:styleLbl>
+  <dgm:styleLbl name="parChTrans2D4">
+    <dgm:fillClrLst meth="repeat">
+      <a:schemeClr val="accent5"/>
+    </dgm:fillClrLst>
+    <dgm:linClrLst meth="repeat">
+      <a:schemeClr val="lt1"/>
+    </dgm:linClrLst>
+    <dgm:effectClrLst/>
+    <dgm:txLinClrLst/>
+    <dgm:txFillClrLst meth="repeat">
+      <a:schemeClr val="lt1"/>
+    </dgm:txFillClrLst>
+    <dgm:txEffectClrLst/>
+  </dgm:styleLbl>
+  <dgm:styleLbl name="parChTrans1D1">
+    <dgm:fillClrLst meth="repeat">
+      <a:schemeClr val="accent2"/>
+    </dgm:fillClrLst>
+    <dgm:linClrLst meth="repeat">
+      <a:schemeClr val="accent2"/>
+    </dgm:linClrLst>
+    <dgm:effectClrLst/>
+    <dgm:txLinClrLst/>
+    <dgm:txFillClrLst meth="repeat">
+      <a:schemeClr val="tx1"/>
+    </dgm:txFillClrLst>
+    <dgm:txEffectClrLst/>
+  </dgm:styleLbl>
+  <dgm:styleLbl name="parChTrans1D2">
+    <dgm:fillClrLst meth="repeat">
+      <a:schemeClr val="accent2">
+        <a:tint val="90000"/>
+      </a:schemeClr>
+    </dgm:fillClrLst>
+    <dgm:linClrLst meth="repeat">
+      <a:schemeClr val="accent3"/>
+    </dgm:linClrLst>
+    <dgm:effectClrLst/>
+    <dgm:txLinClrLst/>
+    <dgm:txFillClrLst meth="repeat">
+      <a:schemeClr val="tx1"/>
+    </dgm:txFillClrLst>
+    <dgm:txEffectClrLst/>
+  </dgm:styleLbl>
+  <dgm:styleLbl name="parChTrans1D3">
+    <dgm:fillClrLst meth="repeat">
+      <a:schemeClr val="accent2">
+        <a:tint val="70000"/>
+      </a:schemeClr>
+    </dgm:fillClrLst>
+    <dgm:linClrLst meth="repeat">
+      <a:schemeClr val="accent4"/>
+    </dgm:linClrLst>
+    <dgm:effectClrLst/>
+    <dgm:txLinClrLst/>
+    <dgm:txFillClrLst meth="repeat">
+      <a:schemeClr val="tx1"/>
+    </dgm:txFillClrLst>
+    <dgm:txEffectClrLst/>
+  </dgm:styleLbl>
+  <dgm:styleLbl name="parChTrans1D4">
+    <dgm:fillClrLst meth="repeat">
+      <a:schemeClr val="accent2">
+        <a:tint val="50000"/>
+      </a:schemeClr>
+    </dgm:fillClrLst>
+    <dgm:linClrLst meth="repeat">
+      <a:schemeClr val="accent5"/>
+    </dgm:linClrLst>
+    <dgm:effectClrLst/>
+    <dgm:txLinClrLst/>
+    <dgm:txFillClrLst meth="repeat">
+      <a:schemeClr val="tx1"/>
+    </dgm:txFillClrLst>
+    <dgm:txEffectClrLst/>
+  </dgm:styleLbl>
+  <dgm:styleLbl name="fgAcc1">
+    <dgm:fillClrLst meth="repeat">
+      <a:schemeClr val="lt1">
+        <a:alpha val="90000"/>
+      </a:schemeClr>
+    </dgm:fillClrLst>
+    <dgm:linClrLst>
+      <a:schemeClr val="accent2"/>
+      <a:schemeClr val="accent3"/>
+    </dgm:linClrLst>
+    <dgm:effectClrLst/>
+    <dgm:txLinClrLst/>
+    <dgm:txFillClrLst meth="repeat">
+      <a:schemeClr val="dk1"/>
+    </dgm:txFillClrLst>
+    <dgm:txEffectClrLst/>
+  </dgm:styleLbl>
+  <dgm:styleLbl name="conFgAcc1">
+    <dgm:fillClrLst meth="repeat">
+      <a:schemeClr val="lt1">
+        <a:alpha val="90000"/>
+      </a:schemeClr>
+    </dgm:fillClrLst>
+    <dgm:linClrLst>
+      <a:schemeClr val="accent2"/>
+      <a:schemeClr val="accent3"/>
+    </dgm:linClrLst>
+    <dgm:effectClrLst/>
+    <dgm:txLinClrLst/>
+    <dgm:txFillClrLst meth="repeat">
+      <a:schemeClr val="dk1"/>
+    </dgm:txFillClrLst>
+    <dgm:txEffectClrLst/>
+  </dgm:styleLbl>
+  <dgm:styleLbl name="alignAcc1">
+    <dgm:fillClrLst meth="repeat">
+      <a:schemeClr val="lt1">
+        <a:alpha val="90000"/>
+      </a:schemeClr>
+    </dgm:fillClrLst>
+    <dgm:linClrLst>
+      <a:schemeClr val="accent2"/>
+      <a:schemeClr val="accent3"/>
+    </dgm:linClrLst>
+    <dgm:effectClrLst/>
+    <dgm:txLinClrLst/>
+    <dgm:txFillClrLst meth="repeat">
+      <a:schemeClr val="dk1"/>
+    </dgm:txFillClrLst>
+    <dgm:txEffectClrLst/>
+  </dgm:styleLbl>
+  <dgm:styleLbl name="trAlignAcc1">
+    <dgm:fillClrLst meth="repeat">
+      <a:schemeClr val="lt1">
+        <a:alpha val="40000"/>
+      </a:schemeClr>
+    </dgm:fillClrLst>
+    <dgm:linClrLst meth="repeat">
+      <a:schemeClr val="accent2"/>
+    </dgm:linClrLst>
+    <dgm:effectClrLst/>
+    <dgm:txLinClrLst/>
+    <dgm:txFillClrLst meth="repeat">
+      <a:schemeClr val="dk1"/>
+    </dgm:txFillClrLst>
+    <dgm:txEffectClrLst/>
+  </dgm:styleLbl>
+  <dgm:styleLbl name="bgAcc1">
+    <dgm:fillClrLst meth="repeat">
+      <a:schemeClr val="lt1">
+        <a:alpha val="90000"/>
+      </a:schemeClr>
+    </dgm:fillClrLst>
+    <dgm:linClrLst>
+      <a:schemeClr val="accent2"/>
+      <a:schemeClr val="accent3"/>
+    </dgm:linClrLst>
+    <dgm:effectClrLst/>
+    <dgm:txLinClrLst/>
+    <dgm:txFillClrLst meth="repeat">
+      <a:schemeClr val="dk1"/>
+    </dgm:txFillClrLst>
+    <dgm:txEffectClrLst/>
+  </dgm:styleLbl>
+  <dgm:styleLbl name="solidFgAcc1">
+    <dgm:fillClrLst meth="repeat">
+      <a:schemeClr val="lt1"/>
+    </dgm:fillClrLst>
+    <dgm:linClrLst>
+      <a:schemeClr val="accent2"/>
+      <a:schemeClr val="accent3"/>
+    </dgm:linClrLst>
+    <dgm:effectClrLst/>
+    <dgm:txLinClrLst/>
+    <dgm:txFillClrLst meth="repeat">
+      <a:schemeClr val="dk1"/>
+    </dgm:txFillClrLst>
+    <dgm:txEffectClrLst/>
+  </dgm:styleLbl>
+  <dgm:styleLbl name="solidAlignAcc1">
+    <dgm:fillClrLst meth="repeat">
+      <a:schemeClr val="lt1"/>
+    </dgm:fillClrLst>
+    <dgm:linClrLst>
+      <a:schemeClr val="accent2"/>
+      <a:schemeClr val="accent3"/>
+    </dgm:linClrLst>
+    <dgm:effectClrLst/>
+    <dgm:txLinClrLst/>
+    <dgm:txFillClrLst meth="repeat">
+      <a:schemeClr val="dk1"/>
+    </dgm:txFillClrLst>
+    <dgm:txEffectClrLst/>
+  </dgm:styleLbl>
+  <dgm:styleLbl name="solidBgAcc1">
+    <dgm:fillClrLst meth="repeat">
+      <a:schemeClr val="lt1"/>
+    </dgm:fillClrLst>
+    <dgm:linClrLst>
+      <a:schemeClr val="accent2"/>
+      <a:schemeClr val="accent3"/>
+    </dgm:linClrLst>
+    <dgm:effectClrLst/>
+    <dgm:txLinClrLst/>
+    <dgm:txFillClrLst meth="repeat">
+      <a:schemeClr val="dk1"/>
+    </dgm:txFillClrLst>
+    <dgm:txEffectClrLst/>
+  </dgm:styleLbl>
+  <dgm:styleLbl name="fgAccFollowNode1">
+    <dgm:fillClrLst>
+      <a:schemeClr val="accent2">
+        <a:tint val="40000"/>
+        <a:alpha val="90000"/>
+      </a:schemeClr>
+      <a:schemeClr val="accent3">
+        <a:tint val="40000"/>
+        <a:alpha val="90000"/>
+      </a:schemeClr>
+    </dgm:fillClrLst>
+    <dgm:linClrLst>
+      <a:schemeClr val="accent2">
+        <a:tint val="40000"/>
+        <a:alpha val="90000"/>
+      </a:schemeClr>
+      <a:schemeClr val="accent3">
+        <a:tint val="40000"/>
+        <a:alpha val="90000"/>
+      </a:schemeClr>
+    </dgm:linClrLst>
+    <dgm:effectClrLst/>
+    <dgm:txLinClrLst/>
+    <dgm:txFillClrLst meth="repeat">
+      <a:schemeClr val="dk1"/>
+    </dgm:txFillClrLst>
+    <dgm:txEffectClrLst/>
+  </dgm:styleLbl>
+  <dgm:styleLbl name="alignAccFollowNode1">
+    <dgm:fillClrLst>
+      <a:schemeClr val="accent2">
+        <a:tint val="40000"/>
+        <a:alpha val="90000"/>
+      </a:schemeClr>
+      <a:schemeClr val="accent3">
+        <a:tint val="40000"/>
+        <a:alpha val="90000"/>
+      </a:schemeClr>
+    </dgm:fillClrLst>
+    <dgm:linClrLst>
+      <a:schemeClr val="accent2">
+        <a:tint val="40000"/>
+        <a:alpha val="90000"/>
+      </a:schemeClr>
+      <a:schemeClr val="accent3">
+        <a:tint val="40000"/>
+        <a:alpha val="90000"/>
+      </a:schemeClr>
+    </dgm:linClrLst>
+    <dgm:effectClrLst/>
+    <dgm:txLinClrLst/>
+    <dgm:txFillClrLst meth="repeat">
+      <a:schemeClr val="dk1"/>
+    </dgm:txFillClrLst>
+    <dgm:txEffectClrLst/>
+  </dgm:styleLbl>
+  <dgm:styleLbl name="bgAccFollowNode1">
+    <dgm:fillClrLst>
+      <a:schemeClr val="accent2">
+        <a:tint val="40000"/>
+        <a:alpha val="90000"/>
+      </a:schemeClr>
+      <a:schemeClr val="accent3">
+        <a:tint val="40000"/>
+        <a:alpha val="90000"/>
+      </a:schemeClr>
+    </dgm:fillClrLst>
+    <dgm:linClrLst>
+      <a:schemeClr val="accent2">
+        <a:tint val="40000"/>
+        <a:alpha val="90000"/>
+      </a:schemeClr>
+      <a:schemeClr val="accent3">
+        <a:tint val="40000"/>
+        <a:alpha val="90000"/>
+      </a:schemeClr>
+    </dgm:linClrLst>
+    <dgm:effectClrLst/>
+    <dgm:txLinClrLst/>
+    <dgm:txFillClrLst meth="repeat">
+      <a:schemeClr val="dk1"/>
+    </dgm:txFillClrLst>
+    <dgm:txEffectClrLst/>
+  </dgm:styleLbl>
+  <dgm:styleLbl name="fgAcc0">
+    <dgm:fillClrLst meth="repeat">
+      <a:schemeClr val="lt1">
+        <a:alpha val="90000"/>
+      </a:schemeClr>
+    </dgm:fillClrLst>
+    <dgm:linClrLst>
+      <a:schemeClr val="accent1"/>
+    </dgm:linClrLst>
+    <dgm:effectClrLst/>
+    <dgm:txLinClrLst/>
+    <dgm:txFillClrLst meth="repeat">
+      <a:schemeClr val="dk1"/>
+    </dgm:txFillClrLst>
+    <dgm:txEffectClrLst/>
+  </dgm:styleLbl>
+  <dgm:styleLbl name="fgAcc2">
+    <dgm:fillClrLst meth="repeat">
+      <a:schemeClr val="lt1">
+        <a:alpha val="90000"/>
+      </a:schemeClr>
+    </dgm:fillClrLst>
+    <dgm:linClrLst>
+      <a:schemeClr val="accent3"/>
+    </dgm:linClrLst>
+    <dgm:effectClrLst/>
+    <dgm:txLinClrLst/>
+    <dgm:txFillClrLst meth="repeat">
+      <a:schemeClr val="dk1"/>
+    </dgm:txFillClrLst>
+    <dgm:txEffectClrLst/>
+  </dgm:styleLbl>
+  <dgm:styleLbl name="fgAcc3">
+    <dgm:fillClrLst meth="repeat">
+      <a:schemeClr val="lt1">
+        <a:alpha val="90000"/>
+      </a:schemeClr>
+    </dgm:fillClrLst>
+    <dgm:linClrLst>
+      <a:schemeClr val="accent4"/>
+    </dgm:linClrLst>
+    <dgm:effectClrLst/>
+    <dgm:txLinClrLst/>
+    <dgm:txFillClrLst meth="repeat">
+      <a:schemeClr val="dk1"/>
+    </dgm:txFillClrLst>
+    <dgm:txEffectClrLst/>
+  </dgm:styleLbl>
+  <dgm:styleLbl name="fgAcc4">
+    <dgm:fillClrLst meth="repeat">
+      <a:schemeClr val="lt1">
+        <a:alpha val="90000"/>
+      </a:schemeClr>
+    </dgm:fillClrLst>
+    <dgm:linClrLst>
+      <a:schemeClr val="accent5"/>
+    </dgm:linClrLst>
+    <dgm:effectClrLst/>
+    <dgm:txLinClrLst/>
+    <dgm:txFillClrLst meth="repeat">
+      <a:schemeClr val="dk1"/>
+    </dgm:txFillClrLst>
+    <dgm:txEffectClrLst/>
+  </dgm:styleLbl>
+  <dgm:styleLbl name="bgShp">
+    <dgm:fillClrLst meth="repeat">
+      <a:schemeClr val="accent2">
+        <a:tint val="40000"/>
+      </a:schemeClr>
+    </dgm:fillClrLst>
+    <dgm:linClrLst meth="repeat">
+      <a:schemeClr val="dk1"/>
+    </dgm:linClrLst>
+    <dgm:effectClrLst/>
+    <dgm:txLinClrLst/>
+    <dgm:txFillClrLst meth="repeat">
+      <a:schemeClr val="dk1"/>
+    </dgm:txFillClrLst>
+    <dgm:txEffectClrLst/>
+  </dgm:styleLbl>
+  <dgm:styleLbl name="dkBgShp">
+    <dgm:fillClrLst meth="repeat">
+      <a:schemeClr val="accent2">
+        <a:shade val="90000"/>
+      </a:schemeClr>
+    </dgm:fillClrLst>
+    <dgm:linClrLst meth="repeat">
+      <a:schemeClr val="dk1"/>
+    </dgm:linClrLst>
+    <dgm:effectClrLst/>
+    <dgm:txLinClrLst/>
+    <dgm:txFillClrLst meth="repeat">
+      <a:schemeClr val="lt1"/>
+    </dgm:txFillClrLst>
+    <dgm:txEffectClrLst/>
+  </dgm:styleLbl>
+  <dgm:styleLbl name="trBgShp">
+    <dgm:fillClrLst meth="repeat">
+      <a:schemeClr val="accent2">
+        <a:tint val="50000"/>
+        <a:alpha val="40000"/>
+      </a:schemeClr>
+    </dgm:fillClrLst>
+    <dgm:linClrLst meth="repeat">
+      <a:schemeClr val="accent2"/>
+    </dgm:linClrLst>
+    <dgm:effectClrLst/>
+    <dgm:txLinClrLst/>
+    <dgm:txFillClrLst meth="repeat">
+      <a:schemeClr val="lt1"/>
+    </dgm:txFillClrLst>
+    <dgm:txEffectClrLst/>
+  </dgm:styleLbl>
+  <dgm:styleLbl name="fgShp">
+    <dgm:fillClrLst meth="repeat">
+      <a:schemeClr val="accent2">
+        <a:tint val="40000"/>
+      </a:schemeClr>
+    </dgm:fillClrLst>
+    <dgm:linClrLst meth="repeat">
+      <a:schemeClr val="lt1"/>
+    </dgm:linClrLst>
+    <dgm:effectClrLst/>
+    <dgm:txLinClrLst/>
+    <dgm:txFillClrLst meth="repeat">
+      <a:schemeClr val="dk1"/>
+    </dgm:txFillClrLst>
+    <dgm:txEffectClrLst/>
+  </dgm:styleLbl>
+  <dgm:styleLbl name="revTx">
+    <dgm:fillClrLst meth="repeat">
+      <a:schemeClr val="lt1">
+        <a:alpha val="0"/>
+      </a:schemeClr>
+    </dgm:fillClrLst>
+    <dgm:linClrLst meth="repeat">
+      <a:schemeClr val="dk1">
+        <a:alpha val="0"/>
+      </a:schemeClr>
+    </dgm:linClrLst>
+    <dgm:effectClrLst/>
+    <dgm:txLinClrLst/>
+    <dgm:txFillClrLst meth="repeat">
+      <a:schemeClr val="tx1"/>
+    </dgm:txFillClrLst>
+    <dgm:txEffectClrLst/>
+  </dgm:styleLbl>
+</dgm:colorsDef>
+</file>
+
+<file path=ppt/diagrams/colors3.xml><?xml version="1.0" encoding="utf-8"?>
 <dgm:colorsDef xmlns:dgm="http://schemas.openxmlformats.org/drawingml/2006/diagram" xmlns:a="http://schemas.openxmlformats.org/drawingml/2006/main" uniqueId="urn:microsoft.com/office/officeart/2005/8/colors/colorful2">
   <dgm:title val=""/>
   <dgm:desc val=""/>
@@ -2058,7 +2840,7 @@
 <dgm:dataModel xmlns:dgm="http://schemas.openxmlformats.org/drawingml/2006/diagram" xmlns:a="http://schemas.openxmlformats.org/drawingml/2006/main">
   <dgm:ptLst>
     <dgm:pt modelId="{45F77B33-08EF-4743-8FFB-CA6F68AF0058}" type="doc">
-      <dgm:prSet loTypeId="urn:microsoft.com/office/officeart/2016/7/layout/RepeatingBendingProcessNew" loCatId="process" qsTypeId="urn:microsoft.com/office/officeart/2005/8/quickstyle/simple1" qsCatId="simple" csTypeId="urn:microsoft.com/office/officeart/2005/8/colors/colorful2" csCatId="colorful"/>
+      <dgm:prSet loTypeId="urn:microsoft.com/office/officeart/2016/7/layout/RepeatingBendingProcessNew" loCatId="process" qsTypeId="urn:microsoft.com/office/officeart/2005/8/quickstyle/simple1" qsCatId="simple" csTypeId="urn:microsoft.com/office/officeart/2005/8/colors/colorful2" csCatId="colorful" phldr="1"/>
       <dgm:spPr/>
       <dgm:t>
         <a:bodyPr/>
@@ -2184,8 +2966,8 @@
         <a:lstStyle/>
         <a:p>
           <a:r>
-            <a:rPr lang="en-US"/>
-            <a:t>Joined the tables on data and sent to MongoDB</a:t>
+            <a:rPr lang="en-US" dirty="0"/>
+            <a:t>Joined the tables on date and stored in MongoDB</a:t>
           </a:r>
         </a:p>
       </dgm:t>
@@ -2422,6 +3204,145 @@
     <dgm:cxn modelId="{82B1BE54-5E09-4077-875A-81F2F13A4092}" type="presParOf" srcId="{FBD88F1E-5CCE-42D3-A587-C76F35A570BF}" destId="{9127662E-9BE0-4717-B9C2-7829BC8B7B62}" srcOrd="9" destOrd="0" presId="urn:microsoft.com/office/officeart/2016/7/layout/RepeatingBendingProcessNew"/>
     <dgm:cxn modelId="{31275C2B-D1D2-4BB1-8B11-43383317818D}" type="presParOf" srcId="{9127662E-9BE0-4717-B9C2-7829BC8B7B62}" destId="{0FB81687-E045-42BF-8753-E45E7AE4F884}" srcOrd="0" destOrd="0" presId="urn:microsoft.com/office/officeart/2016/7/layout/RepeatingBendingProcessNew"/>
     <dgm:cxn modelId="{8BF900BD-2286-4783-B443-4AD3BFEB0832}" type="presParOf" srcId="{FBD88F1E-5CCE-42D3-A587-C76F35A570BF}" destId="{F3918773-BAF7-44AE-B373-330BA435B88E}" srcOrd="10" destOrd="0" presId="urn:microsoft.com/office/officeart/2016/7/layout/RepeatingBendingProcessNew"/>
+  </dgm:cxnLst>
+  <dgm:bg/>
+  <dgm:whole/>
+  <dgm:extLst>
+    <a:ext uri="http://schemas.microsoft.com/office/drawing/2008/diagram">
+      <dsp:dataModelExt xmlns:dsp="http://schemas.microsoft.com/office/drawing/2008/diagram" relId="rId6" minVer="http://schemas.openxmlformats.org/drawingml/2006/diagram"/>
+    </a:ext>
+  </dgm:extLst>
+</dgm:dataModel>
+</file>
+
+<file path=ppt/diagrams/data3.xml><?xml version="1.0" encoding="utf-8"?>
+<dgm:dataModel xmlns:dgm="http://schemas.openxmlformats.org/drawingml/2006/diagram" xmlns:a="http://schemas.openxmlformats.org/drawingml/2006/main">
+  <dgm:ptLst>
+    <dgm:pt modelId="{8CA57622-D6AD-4040-9CE9-48CCDD589578}" type="doc">
+      <dgm:prSet loTypeId="urn:microsoft.com/office/officeart/2005/8/layout/process4" loCatId="process" qsTypeId="urn:microsoft.com/office/officeart/2005/8/quickstyle/simple2" qsCatId="simple" csTypeId="urn:microsoft.com/office/officeart/2005/8/colors/colorful2" csCatId="colorful"/>
+      <dgm:spPr/>
+      <dgm:t>
+        <a:bodyPr/>
+        <a:lstStyle/>
+        <a:p>
+          <a:endParaRPr lang="en-US"/>
+        </a:p>
+      </dgm:t>
+    </dgm:pt>
+    <dgm:pt modelId="{F49161FC-F604-4581-A7B1-F4AB330B5C6E}">
+      <dgm:prSet/>
+      <dgm:spPr/>
+      <dgm:t>
+        <a:bodyPr/>
+        <a:lstStyle/>
+        <a:p>
+          <a:r>
+            <a:rPr lang="en-US"/>
+            <a:t>The ^VIX is negatively correlated to the S&amp;P500</a:t>
+          </a:r>
+        </a:p>
+      </dgm:t>
+    </dgm:pt>
+    <dgm:pt modelId="{3292C865-BA4C-4840-9385-7FC227B493BA}" type="parTrans" cxnId="{3AC8EC4D-7ECD-4B7E-AF5B-A5E283361BE1}">
+      <dgm:prSet/>
+      <dgm:spPr/>
+      <dgm:t>
+        <a:bodyPr/>
+        <a:lstStyle/>
+        <a:p>
+          <a:endParaRPr lang="en-US"/>
+        </a:p>
+      </dgm:t>
+    </dgm:pt>
+    <dgm:pt modelId="{4EA7CCFE-88B2-461B-BB6C-49F575CD6B3E}" type="sibTrans" cxnId="{3AC8EC4D-7ECD-4B7E-AF5B-A5E283361BE1}">
+      <dgm:prSet/>
+      <dgm:spPr/>
+      <dgm:t>
+        <a:bodyPr/>
+        <a:lstStyle/>
+        <a:p>
+          <a:endParaRPr lang="en-US"/>
+        </a:p>
+      </dgm:t>
+    </dgm:pt>
+    <dgm:pt modelId="{4D6A9867-7DA2-4878-87DE-944C1E8874BD}">
+      <dgm:prSet/>
+      <dgm:spPr/>
+      <dgm:t>
+        <a:bodyPr/>
+        <a:lstStyle/>
+        <a:p>
+          <a:r>
+            <a:rPr lang="en-US"/>
+            <a:t>The Unemployment Rate is directly affected by the market, all though with a slight delay in reaction. The unemployment rate also takes longer to recover than the S&amp;P500.</a:t>
+          </a:r>
+        </a:p>
+      </dgm:t>
+    </dgm:pt>
+    <dgm:pt modelId="{8BED6E81-C02A-4AA4-88CE-01D4CCE91594}" type="parTrans" cxnId="{4F2E888F-3549-4E15-8C28-056D80CF21AC}">
+      <dgm:prSet/>
+      <dgm:spPr/>
+      <dgm:t>
+        <a:bodyPr/>
+        <a:lstStyle/>
+        <a:p>
+          <a:endParaRPr lang="en-US"/>
+        </a:p>
+      </dgm:t>
+    </dgm:pt>
+    <dgm:pt modelId="{27021A27-6BE8-4060-A09F-4BAE222F3757}" type="sibTrans" cxnId="{4F2E888F-3549-4E15-8C28-056D80CF21AC}">
+      <dgm:prSet/>
+      <dgm:spPr/>
+      <dgm:t>
+        <a:bodyPr/>
+        <a:lstStyle/>
+        <a:p>
+          <a:endParaRPr lang="en-US"/>
+        </a:p>
+      </dgm:t>
+    </dgm:pt>
+    <dgm:pt modelId="{FEDE8D22-4A2C-4C65-A576-EF91A0CA5011}" type="pres">
+      <dgm:prSet presAssocID="{8CA57622-D6AD-4040-9CE9-48CCDD589578}" presName="Name0" presStyleCnt="0">
+        <dgm:presLayoutVars>
+          <dgm:dir/>
+          <dgm:animLvl val="lvl"/>
+          <dgm:resizeHandles val="exact"/>
+        </dgm:presLayoutVars>
+      </dgm:prSet>
+      <dgm:spPr/>
+    </dgm:pt>
+    <dgm:pt modelId="{514F4518-C94C-471C-B0A8-98077DBC511A}" type="pres">
+      <dgm:prSet presAssocID="{4D6A9867-7DA2-4878-87DE-944C1E8874BD}" presName="boxAndChildren" presStyleCnt="0"/>
+      <dgm:spPr/>
+    </dgm:pt>
+    <dgm:pt modelId="{94543BE4-1089-4253-8AB5-9EF04990DC41}" type="pres">
+      <dgm:prSet presAssocID="{4D6A9867-7DA2-4878-87DE-944C1E8874BD}" presName="parentTextBox" presStyleLbl="node1" presStyleIdx="0" presStyleCnt="2"/>
+      <dgm:spPr/>
+    </dgm:pt>
+    <dgm:pt modelId="{E2062AAF-15DA-4AFC-8B3F-CDAE7430EE43}" type="pres">
+      <dgm:prSet presAssocID="{4EA7CCFE-88B2-461B-BB6C-49F575CD6B3E}" presName="sp" presStyleCnt="0"/>
+      <dgm:spPr/>
+    </dgm:pt>
+    <dgm:pt modelId="{4B356910-753F-4476-A5F0-6B55EC486640}" type="pres">
+      <dgm:prSet presAssocID="{F49161FC-F604-4581-A7B1-F4AB330B5C6E}" presName="arrowAndChildren" presStyleCnt="0"/>
+      <dgm:spPr/>
+    </dgm:pt>
+    <dgm:pt modelId="{BAA42A5F-A0F1-4DEF-9679-91EEC6237F7E}" type="pres">
+      <dgm:prSet presAssocID="{F49161FC-F604-4581-A7B1-F4AB330B5C6E}" presName="parentTextArrow" presStyleLbl="node1" presStyleIdx="1" presStyleCnt="2"/>
+      <dgm:spPr/>
+    </dgm:pt>
+  </dgm:ptLst>
+  <dgm:cxnLst>
+    <dgm:cxn modelId="{24D1AE1C-31CC-46DD-B312-0CB1942C986C}" type="presOf" srcId="{8CA57622-D6AD-4040-9CE9-48CCDD589578}" destId="{FEDE8D22-4A2C-4C65-A576-EF91A0CA5011}" srcOrd="0" destOrd="0" presId="urn:microsoft.com/office/officeart/2005/8/layout/process4"/>
+    <dgm:cxn modelId="{3AC8EC4D-7ECD-4B7E-AF5B-A5E283361BE1}" srcId="{8CA57622-D6AD-4040-9CE9-48CCDD589578}" destId="{F49161FC-F604-4581-A7B1-F4AB330B5C6E}" srcOrd="0" destOrd="0" parTransId="{3292C865-BA4C-4840-9385-7FC227B493BA}" sibTransId="{4EA7CCFE-88B2-461B-BB6C-49F575CD6B3E}"/>
+    <dgm:cxn modelId="{5C1D4957-CF1E-474C-9D2D-37B74C11A7CA}" type="presOf" srcId="{F49161FC-F604-4581-A7B1-F4AB330B5C6E}" destId="{BAA42A5F-A0F1-4DEF-9679-91EEC6237F7E}" srcOrd="0" destOrd="0" presId="urn:microsoft.com/office/officeart/2005/8/layout/process4"/>
+    <dgm:cxn modelId="{4F2E888F-3549-4E15-8C28-056D80CF21AC}" srcId="{8CA57622-D6AD-4040-9CE9-48CCDD589578}" destId="{4D6A9867-7DA2-4878-87DE-944C1E8874BD}" srcOrd="1" destOrd="0" parTransId="{8BED6E81-C02A-4AA4-88CE-01D4CCE91594}" sibTransId="{27021A27-6BE8-4060-A09F-4BAE222F3757}"/>
+    <dgm:cxn modelId="{51CC7EB4-90AC-4892-A971-A1D127920FB0}" type="presOf" srcId="{4D6A9867-7DA2-4878-87DE-944C1E8874BD}" destId="{94543BE4-1089-4253-8AB5-9EF04990DC41}" srcOrd="0" destOrd="0" presId="urn:microsoft.com/office/officeart/2005/8/layout/process4"/>
+    <dgm:cxn modelId="{B4750908-1C1B-45AE-851B-621FB0568A2A}" type="presParOf" srcId="{FEDE8D22-4A2C-4C65-A576-EF91A0CA5011}" destId="{514F4518-C94C-471C-B0A8-98077DBC511A}" srcOrd="0" destOrd="0" presId="urn:microsoft.com/office/officeart/2005/8/layout/process4"/>
+    <dgm:cxn modelId="{21F6268F-757F-457E-BB0C-9C23BA628B38}" type="presParOf" srcId="{514F4518-C94C-471C-B0A8-98077DBC511A}" destId="{94543BE4-1089-4253-8AB5-9EF04990DC41}" srcOrd="0" destOrd="0" presId="urn:microsoft.com/office/officeart/2005/8/layout/process4"/>
+    <dgm:cxn modelId="{FCB82A20-325B-4C2A-8701-3FD90FA96E57}" type="presParOf" srcId="{FEDE8D22-4A2C-4C65-A576-EF91A0CA5011}" destId="{E2062AAF-15DA-4AFC-8B3F-CDAE7430EE43}" srcOrd="1" destOrd="0" presId="urn:microsoft.com/office/officeart/2005/8/layout/process4"/>
+    <dgm:cxn modelId="{6E9E9455-94C3-4E78-B638-3D6DE09634D9}" type="presParOf" srcId="{FEDE8D22-4A2C-4C65-A576-EF91A0CA5011}" destId="{4B356910-753F-4476-A5F0-6B55EC486640}" srcOrd="2" destOrd="0" presId="urn:microsoft.com/office/officeart/2005/8/layout/process4"/>
+    <dgm:cxn modelId="{0352B4D4-AF54-44B6-8E21-86B7B03923C8}" type="presParOf" srcId="{4B356910-753F-4476-A5F0-6B55EC486640}" destId="{BAA42A5F-A0F1-4DEF-9679-91EEC6237F7E}" srcOrd="0" destOrd="0" presId="urn:microsoft.com/office/officeart/2005/8/layout/process4"/>
   </dgm:cxnLst>
   <dgm:bg/>
   <dgm:whole/>
@@ -3396,8 +4317,8 @@
             <a:buNone/>
           </a:pPr>
           <a:r>
-            <a:rPr lang="en-US" sz="2300" kern="1200"/>
-            <a:t>Joined the tables on data and sent to MongoDB</a:t>
+            <a:rPr lang="en-US" sz="2300" kern="1200" dirty="0"/>
+            <a:t>Joined the tables on date and stored in MongoDB</a:t>
           </a:r>
         </a:p>
       </dsp:txBody>
@@ -3641,6 +4562,174 @@
       <dsp:txXfrm>
         <a:off x="3555988" y="4321574"/>
         <a:ext cx="2601625" cy="1560975"/>
+      </dsp:txXfrm>
+    </dsp:sp>
+  </dsp:spTree>
+</dsp:drawing>
+</file>
+
+<file path=ppt/diagrams/drawing3.xml><?xml version="1.0" encoding="utf-8"?>
+<dsp:drawing xmlns:dgm="http://schemas.openxmlformats.org/drawingml/2006/diagram" xmlns:dsp="http://schemas.microsoft.com/office/drawing/2008/diagram" xmlns:a="http://schemas.openxmlformats.org/drawingml/2006/main">
+  <dsp:spTree>
+    <dsp:nvGrpSpPr>
+      <dsp:cNvPr id="0" name=""/>
+      <dsp:cNvGrpSpPr/>
+    </dsp:nvGrpSpPr>
+    <dsp:grpSpPr/>
+    <dsp:sp modelId="{94543BE4-1089-4253-8AB5-9EF04990DC41}">
+      <dsp:nvSpPr>
+        <dsp:cNvPr id="0" name=""/>
+        <dsp:cNvSpPr/>
+      </dsp:nvSpPr>
+      <dsp:spPr>
+        <a:xfrm>
+          <a:off x="0" y="2730899"/>
+          <a:ext cx="7315200" cy="1791765"/>
+        </a:xfrm>
+        <a:prstGeom prst="rect">
+          <a:avLst/>
+        </a:prstGeom>
+        <a:solidFill>
+          <a:schemeClr val="accent2">
+            <a:hueOff val="0"/>
+            <a:satOff val="0"/>
+            <a:lumOff val="0"/>
+            <a:alphaOff val="0"/>
+          </a:schemeClr>
+        </a:solidFill>
+        <a:ln w="19050" cap="flat" cmpd="sng" algn="ctr">
+          <a:solidFill>
+            <a:schemeClr val="lt1">
+              <a:hueOff val="0"/>
+              <a:satOff val="0"/>
+              <a:lumOff val="0"/>
+              <a:alphaOff val="0"/>
+            </a:schemeClr>
+          </a:solidFill>
+          <a:prstDash val="solid"/>
+          <a:miter lim="800000"/>
+        </a:ln>
+        <a:effectLst/>
+      </dsp:spPr>
+      <dsp:style>
+        <a:lnRef idx="3">
+          <a:scrgbClr r="0" g="0" b="0"/>
+        </a:lnRef>
+        <a:fillRef idx="1">
+          <a:scrgbClr r="0" g="0" b="0"/>
+        </a:fillRef>
+        <a:effectRef idx="1">
+          <a:scrgbClr r="0" g="0" b="0"/>
+        </a:effectRef>
+        <a:fontRef idx="minor">
+          <a:schemeClr val="lt1"/>
+        </a:fontRef>
+      </dsp:style>
+      <dsp:txBody>
+        <a:bodyPr spcFirstLastPara="0" vert="horz" wrap="square" lIns="177800" tIns="177800" rIns="177800" bIns="177800" numCol="1" spcCol="1270" anchor="ctr" anchorCtr="0">
+          <a:noAutofit/>
+        </a:bodyPr>
+        <a:lstStyle/>
+        <a:p>
+          <a:pPr marL="0" lvl="0" indent="0" algn="ctr" defTabSz="1111250">
+            <a:lnSpc>
+              <a:spcPct val="90000"/>
+            </a:lnSpc>
+            <a:spcBef>
+              <a:spcPct val="0"/>
+            </a:spcBef>
+            <a:spcAft>
+              <a:spcPct val="35000"/>
+            </a:spcAft>
+            <a:buNone/>
+          </a:pPr>
+          <a:r>
+            <a:rPr lang="en-US" sz="2500" kern="1200"/>
+            <a:t>The Unemployment Rate is directly affected by the market, all though with a slight delay in reaction. The unemployment rate also takes longer to recover than the S&amp;P500.</a:t>
+          </a:r>
+        </a:p>
+      </dsp:txBody>
+      <dsp:txXfrm>
+        <a:off x="0" y="2730899"/>
+        <a:ext cx="7315200" cy="1791765"/>
+      </dsp:txXfrm>
+    </dsp:sp>
+    <dsp:sp modelId="{BAA42A5F-A0F1-4DEF-9679-91EEC6237F7E}">
+      <dsp:nvSpPr>
+        <dsp:cNvPr id="0" name=""/>
+        <dsp:cNvSpPr/>
+      </dsp:nvSpPr>
+      <dsp:spPr>
+        <a:xfrm rot="10800000">
+          <a:off x="0" y="2040"/>
+          <a:ext cx="7315200" cy="2755735"/>
+        </a:xfrm>
+        <a:prstGeom prst="upArrowCallout">
+          <a:avLst/>
+        </a:prstGeom>
+        <a:solidFill>
+          <a:schemeClr val="accent2">
+            <a:hueOff val="-1455363"/>
+            <a:satOff val="-83928"/>
+            <a:lumOff val="8628"/>
+            <a:alphaOff val="0"/>
+          </a:schemeClr>
+        </a:solidFill>
+        <a:ln w="19050" cap="flat" cmpd="sng" algn="ctr">
+          <a:solidFill>
+            <a:schemeClr val="lt1">
+              <a:hueOff val="0"/>
+              <a:satOff val="0"/>
+              <a:lumOff val="0"/>
+              <a:alphaOff val="0"/>
+            </a:schemeClr>
+          </a:solidFill>
+          <a:prstDash val="solid"/>
+          <a:miter lim="800000"/>
+        </a:ln>
+        <a:effectLst/>
+      </dsp:spPr>
+      <dsp:style>
+        <a:lnRef idx="3">
+          <a:scrgbClr r="0" g="0" b="0"/>
+        </a:lnRef>
+        <a:fillRef idx="1">
+          <a:scrgbClr r="0" g="0" b="0"/>
+        </a:fillRef>
+        <a:effectRef idx="1">
+          <a:scrgbClr r="0" g="0" b="0"/>
+        </a:effectRef>
+        <a:fontRef idx="minor">
+          <a:schemeClr val="lt1"/>
+        </a:fontRef>
+      </dsp:style>
+      <dsp:txBody>
+        <a:bodyPr spcFirstLastPara="0" vert="horz" wrap="square" lIns="177800" tIns="177800" rIns="177800" bIns="177800" numCol="1" spcCol="1270" anchor="ctr" anchorCtr="0">
+          <a:noAutofit/>
+        </a:bodyPr>
+        <a:lstStyle/>
+        <a:p>
+          <a:pPr marL="0" lvl="0" indent="0" algn="ctr" defTabSz="1111250">
+            <a:lnSpc>
+              <a:spcPct val="90000"/>
+            </a:lnSpc>
+            <a:spcBef>
+              <a:spcPct val="0"/>
+            </a:spcBef>
+            <a:spcAft>
+              <a:spcPct val="35000"/>
+            </a:spcAft>
+            <a:buNone/>
+          </a:pPr>
+          <a:r>
+            <a:rPr lang="en-US" sz="2500" kern="1200"/>
+            <a:t>The ^VIX is negatively correlated to the S&amp;P500</a:t>
+          </a:r>
+        </a:p>
+      </dsp:txBody>
+      <dsp:txXfrm rot="10800000">
+        <a:off x="0" y="2040"/>
+        <a:ext cx="7315200" cy="1790594"/>
       </dsp:txXfrm>
     </dsp:sp>
   </dsp:spTree>
@@ -4133,6 +5222,359 @@
 </dgm:layoutDef>
 </file>
 
+<file path=ppt/diagrams/layout3.xml><?xml version="1.0" encoding="utf-8"?>
+<dgm:layoutDef xmlns:dgm="http://schemas.openxmlformats.org/drawingml/2006/diagram" xmlns:a="http://schemas.openxmlformats.org/drawingml/2006/main" uniqueId="urn:microsoft.com/office/officeart/2005/8/layout/process4">
+  <dgm:title val=""/>
+  <dgm:desc val=""/>
+  <dgm:catLst>
+    <dgm:cat type="process" pri="16000"/>
+    <dgm:cat type="list" pri="20000"/>
+  </dgm:catLst>
+  <dgm:sampData>
+    <dgm:dataModel>
+      <dgm:ptLst>
+        <dgm:pt modelId="0" type="doc"/>
+        <dgm:pt modelId="1">
+          <dgm:prSet phldr="1"/>
+        </dgm:pt>
+        <dgm:pt modelId="11">
+          <dgm:prSet phldr="1"/>
+        </dgm:pt>
+        <dgm:pt modelId="12">
+          <dgm:prSet phldr="1"/>
+        </dgm:pt>
+        <dgm:pt modelId="2">
+          <dgm:prSet phldr="1"/>
+        </dgm:pt>
+        <dgm:pt modelId="21">
+          <dgm:prSet phldr="1"/>
+        </dgm:pt>
+        <dgm:pt modelId="22">
+          <dgm:prSet phldr="1"/>
+        </dgm:pt>
+        <dgm:pt modelId="3">
+          <dgm:prSet phldr="1"/>
+        </dgm:pt>
+        <dgm:pt modelId="31">
+          <dgm:prSet phldr="1"/>
+        </dgm:pt>
+        <dgm:pt modelId="32">
+          <dgm:prSet phldr="1"/>
+        </dgm:pt>
+      </dgm:ptLst>
+      <dgm:cxnLst>
+        <dgm:cxn modelId="4" srcId="0" destId="1" srcOrd="0" destOrd="0"/>
+        <dgm:cxn modelId="5" srcId="0" destId="2" srcOrd="1" destOrd="0"/>
+        <dgm:cxn modelId="6" srcId="0" destId="3" srcOrd="2" destOrd="0"/>
+        <dgm:cxn modelId="13" srcId="1" destId="11" srcOrd="0" destOrd="0"/>
+        <dgm:cxn modelId="14" srcId="1" destId="12" srcOrd="1" destOrd="0"/>
+        <dgm:cxn modelId="23" srcId="2" destId="21" srcOrd="0" destOrd="0"/>
+        <dgm:cxn modelId="24" srcId="2" destId="22" srcOrd="1" destOrd="0"/>
+        <dgm:cxn modelId="33" srcId="3" destId="31" srcOrd="0" destOrd="0"/>
+        <dgm:cxn modelId="34" srcId="3" destId="32" srcOrd="1" destOrd="0"/>
+      </dgm:cxnLst>
+      <dgm:bg/>
+      <dgm:whole/>
+    </dgm:dataModel>
+  </dgm:sampData>
+  <dgm:styleData>
+    <dgm:dataModel>
+      <dgm:ptLst>
+        <dgm:pt modelId="0" type="doc"/>
+        <dgm:pt modelId="1"/>
+        <dgm:pt modelId="11"/>
+        <dgm:pt modelId="2"/>
+        <dgm:pt modelId="21"/>
+      </dgm:ptLst>
+      <dgm:cxnLst>
+        <dgm:cxn modelId="4" srcId="0" destId="1" srcOrd="0" destOrd="0"/>
+        <dgm:cxn modelId="5" srcId="0" destId="2" srcOrd="1" destOrd="0"/>
+        <dgm:cxn modelId="13" srcId="1" destId="11" srcOrd="0" destOrd="0"/>
+        <dgm:cxn modelId="23" srcId="2" destId="21" srcOrd="0" destOrd="0"/>
+      </dgm:cxnLst>
+      <dgm:bg/>
+      <dgm:whole/>
+    </dgm:dataModel>
+  </dgm:styleData>
+  <dgm:clrData>
+    <dgm:dataModel>
+      <dgm:ptLst>
+        <dgm:pt modelId="0" type="doc"/>
+        <dgm:pt modelId="1"/>
+        <dgm:pt modelId="11"/>
+        <dgm:pt modelId="2"/>
+        <dgm:pt modelId="21"/>
+        <dgm:pt modelId="3"/>
+        <dgm:pt modelId="31"/>
+        <dgm:pt modelId="4"/>
+        <dgm:pt modelId="41"/>
+      </dgm:ptLst>
+      <dgm:cxnLst>
+        <dgm:cxn modelId="5" srcId="0" destId="1" srcOrd="0" destOrd="0"/>
+        <dgm:cxn modelId="6" srcId="0" destId="2" srcOrd="1" destOrd="0"/>
+        <dgm:cxn modelId="7" srcId="0" destId="3" srcOrd="2" destOrd="0"/>
+        <dgm:cxn modelId="8" srcId="0" destId="4" srcOrd="3" destOrd="0"/>
+        <dgm:cxn modelId="13" srcId="1" destId="11" srcOrd="0" destOrd="0"/>
+        <dgm:cxn modelId="23" srcId="2" destId="21" srcOrd="0" destOrd="0"/>
+        <dgm:cxn modelId="33" srcId="3" destId="31" srcOrd="0" destOrd="0"/>
+        <dgm:cxn modelId="43" srcId="4" destId="41" srcOrd="0" destOrd="0"/>
+      </dgm:cxnLst>
+      <dgm:bg/>
+      <dgm:whole/>
+    </dgm:dataModel>
+  </dgm:clrData>
+  <dgm:layoutNode name="Name0">
+    <dgm:varLst>
+      <dgm:dir/>
+      <dgm:animLvl val="lvl"/>
+      <dgm:resizeHandles val="exact"/>
+    </dgm:varLst>
+    <dgm:alg type="lin">
+      <dgm:param type="linDir" val="fromB"/>
+    </dgm:alg>
+    <dgm:shape xmlns:r="http://schemas.openxmlformats.org/officeDocument/2006/relationships" r:blip="">
+      <dgm:adjLst/>
+    </dgm:shape>
+    <dgm:presOf/>
+    <dgm:constrLst>
+      <dgm:constr type="h" for="ch" forName="boxAndChildren" refType="h"/>
+      <dgm:constr type="h" for="ch" forName="arrowAndChildren" refType="h" refFor="ch" refForName="boxAndChildren" op="equ" fact="1.538"/>
+      <dgm:constr type="w" for="ch" forName="arrowAndChildren" refType="w"/>
+      <dgm:constr type="w" for="ch" forName="boxAndChildren" refType="w"/>
+      <dgm:constr type="h" for="ch" forName="sp" refType="h" fact="-0.015"/>
+      <dgm:constr type="primFontSz" for="des" forName="parentTextBox" val="65"/>
+      <dgm:constr type="primFontSz" for="des" forName="parentTextArrow" refType="primFontSz" refFor="des" refForName="parentTextBox" op="equ"/>
+      <dgm:constr type="primFontSz" for="des" forName="childTextArrow" val="65"/>
+      <dgm:constr type="primFontSz" for="des" forName="childTextBox" refType="primFontSz" refFor="des" refForName="childTextArrow" op="equ"/>
+    </dgm:constrLst>
+    <dgm:ruleLst/>
+    <dgm:forEach name="Name1" axis="ch" ptType="node" st="-1" step="-1">
+      <dgm:choose name="Name2">
+        <dgm:if name="Name3" axis="self" ptType="node" func="revPos" op="equ" val="1">
+          <dgm:layoutNode name="boxAndChildren">
+            <dgm:alg type="composite"/>
+            <dgm:shape xmlns:r="http://schemas.openxmlformats.org/officeDocument/2006/relationships" r:blip="">
+              <dgm:adjLst/>
+            </dgm:shape>
+            <dgm:presOf/>
+            <dgm:choose name="Name4">
+              <dgm:if name="Name5" axis="ch" ptType="node" func="cnt" op="gte" val="1">
+                <dgm:constrLst>
+                  <dgm:constr type="w" for="ch" forName="parentTextBox" refType="w"/>
+                  <dgm:constr type="h" for="ch" forName="parentTextBox" refType="h" fact="0.54"/>
+                  <dgm:constr type="t" for="ch" forName="parentTextBox"/>
+                  <dgm:constr type="w" for="ch" forName="entireBox" refType="w"/>
+                  <dgm:constr type="h" for="ch" forName="entireBox" refType="h"/>
+                  <dgm:constr type="w" for="ch" forName="descendantBox" refType="w"/>
+                  <dgm:constr type="b" for="ch" forName="descendantBox" refType="h" fact="0.98"/>
+                  <dgm:constr type="h" for="ch" forName="descendantBox" refType="h" fact="0.46"/>
+                </dgm:constrLst>
+              </dgm:if>
+              <dgm:else name="Name6">
+                <dgm:constrLst>
+                  <dgm:constr type="w" for="ch" forName="parentTextBox" refType="w"/>
+                  <dgm:constr type="h" for="ch" forName="parentTextBox" refType="h"/>
+                </dgm:constrLst>
+              </dgm:else>
+            </dgm:choose>
+            <dgm:ruleLst/>
+            <dgm:layoutNode name="parentTextBox">
+              <dgm:alg type="tx"/>
+              <dgm:choose name="Name7">
+                <dgm:if name="Name8" axis="ch" ptType="node" func="cnt" op="gte" val="1">
+                  <dgm:shape xmlns:r="http://schemas.openxmlformats.org/officeDocument/2006/relationships" type="rect" r:blip="" zOrderOff="1" hideGeom="1">
+                    <dgm:adjLst/>
+                  </dgm:shape>
+                </dgm:if>
+                <dgm:else name="Name9">
+                  <dgm:shape xmlns:r="http://schemas.openxmlformats.org/officeDocument/2006/relationships" type="rect" r:blip="">
+                    <dgm:adjLst/>
+                  </dgm:shape>
+                </dgm:else>
+              </dgm:choose>
+              <dgm:presOf axis="self"/>
+              <dgm:constrLst/>
+              <dgm:ruleLst>
+                <dgm:rule type="primFontSz" val="5" fact="NaN" max="NaN"/>
+              </dgm:ruleLst>
+            </dgm:layoutNode>
+            <dgm:choose name="Name10">
+              <dgm:if name="Name11" axis="ch" ptType="node" func="cnt" op="gte" val="1">
+                <dgm:layoutNode name="entireBox">
+                  <dgm:alg type="sp"/>
+                  <dgm:shape xmlns:r="http://schemas.openxmlformats.org/officeDocument/2006/relationships" type="rect" r:blip="">
+                    <dgm:adjLst/>
+                  </dgm:shape>
+                  <dgm:presOf axis="self"/>
+                  <dgm:constrLst/>
+                  <dgm:ruleLst/>
+                </dgm:layoutNode>
+                <dgm:layoutNode name="descendantBox" styleLbl="fgAccFollowNode1">
+                  <dgm:choose name="Name12">
+                    <dgm:if name="Name13" func="var" arg="dir" op="equ" val="norm">
+                      <dgm:alg type="lin"/>
+                    </dgm:if>
+                    <dgm:else name="Name14">
+                      <dgm:alg type="lin">
+                        <dgm:param type="linDir" val="fromR"/>
+                      </dgm:alg>
+                    </dgm:else>
+                  </dgm:choose>
+                  <dgm:shape xmlns:r="http://schemas.openxmlformats.org/officeDocument/2006/relationships" r:blip="">
+                    <dgm:adjLst/>
+                  </dgm:shape>
+                  <dgm:presOf/>
+                  <dgm:constrLst>
+                    <dgm:constr type="w" for="ch" forName="childTextBox" refType="w"/>
+                    <dgm:constr type="h" for="ch" forName="childTextBox" refType="h"/>
+                  </dgm:constrLst>
+                  <dgm:ruleLst/>
+                  <dgm:forEach name="Name15" axis="ch" ptType="node">
+                    <dgm:layoutNode name="childTextBox" styleLbl="fgAccFollowNode1">
+                      <dgm:varLst>
+                        <dgm:bulletEnabled val="1"/>
+                      </dgm:varLst>
+                      <dgm:alg type="tx"/>
+                      <dgm:shape xmlns:r="http://schemas.openxmlformats.org/officeDocument/2006/relationships" type="rect" r:blip="">
+                        <dgm:adjLst/>
+                      </dgm:shape>
+                      <dgm:presOf axis="desOrSelf" ptType="node"/>
+                      <dgm:constrLst>
+                        <dgm:constr type="tMarg" refType="primFontSz" fact="0.1"/>
+                        <dgm:constr type="bMarg" refType="primFontSz" fact="0.1"/>
+                      </dgm:constrLst>
+                      <dgm:ruleLst>
+                        <dgm:rule type="primFontSz" val="5" fact="NaN" max="NaN"/>
+                      </dgm:ruleLst>
+                    </dgm:layoutNode>
+                  </dgm:forEach>
+                </dgm:layoutNode>
+              </dgm:if>
+              <dgm:else name="Name16"/>
+            </dgm:choose>
+          </dgm:layoutNode>
+        </dgm:if>
+        <dgm:else name="Name17">
+          <dgm:layoutNode name="arrowAndChildren">
+            <dgm:alg type="composite"/>
+            <dgm:shape xmlns:r="http://schemas.openxmlformats.org/officeDocument/2006/relationships" r:blip="">
+              <dgm:adjLst/>
+            </dgm:shape>
+            <dgm:presOf/>
+            <dgm:choose name="Name18">
+              <dgm:if name="Name19" axis="ch" ptType="node" func="cnt" op="gte" val="1">
+                <dgm:constrLst>
+                  <dgm:constr type="w" for="ch" forName="parentTextArrow" refType="w"/>
+                  <dgm:constr type="t" for="ch" forName="parentTextArrow"/>
+                  <dgm:constr type="h" for="ch" forName="parentTextArrow" refType="h" fact="0.351"/>
+                  <dgm:constr type="w" for="ch" forName="arrow" refType="w"/>
+                  <dgm:constr type="h" for="ch" forName="arrow" refType="h"/>
+                  <dgm:constr type="w" for="ch" forName="descendantArrow" refType="w"/>
+                  <dgm:constr type="b" for="ch" forName="descendantArrow" refType="h" fact="0.65"/>
+                  <dgm:constr type="h" for="ch" forName="descendantArrow" refType="h" fact="0.299"/>
+                </dgm:constrLst>
+              </dgm:if>
+              <dgm:else name="Name20">
+                <dgm:constrLst>
+                  <dgm:constr type="w" for="ch" forName="parentTextArrow" refType="w"/>
+                  <dgm:constr type="h" for="ch" forName="parentTextArrow" refType="h"/>
+                </dgm:constrLst>
+              </dgm:else>
+            </dgm:choose>
+            <dgm:ruleLst/>
+            <dgm:layoutNode name="parentTextArrow">
+              <dgm:alg type="tx"/>
+              <dgm:choose name="Name21">
+                <dgm:if name="Name22" axis="ch" ptType="node" func="cnt" op="gte" val="1">
+                  <dgm:shape xmlns:r="http://schemas.openxmlformats.org/officeDocument/2006/relationships" type="rect" r:blip="" zOrderOff="1" hideGeom="1">
+                    <dgm:adjLst/>
+                  </dgm:shape>
+                </dgm:if>
+                <dgm:else name="Name23">
+                  <dgm:shape xmlns:r="http://schemas.openxmlformats.org/officeDocument/2006/relationships" rot="180" type="upArrowCallout" r:blip="">
+                    <dgm:adjLst/>
+                  </dgm:shape>
+                </dgm:else>
+              </dgm:choose>
+              <dgm:presOf axis="self"/>
+              <dgm:constrLst/>
+              <dgm:ruleLst>
+                <dgm:rule type="primFontSz" val="5" fact="NaN" max="NaN"/>
+              </dgm:ruleLst>
+            </dgm:layoutNode>
+            <dgm:choose name="Name24">
+              <dgm:if name="Name25" axis="ch" ptType="node" func="cnt" op="gte" val="1">
+                <dgm:layoutNode name="arrow">
+                  <dgm:alg type="sp"/>
+                  <dgm:shape xmlns:r="http://schemas.openxmlformats.org/officeDocument/2006/relationships" rot="180" type="upArrowCallout" r:blip="">
+                    <dgm:adjLst/>
+                  </dgm:shape>
+                  <dgm:presOf axis="self"/>
+                  <dgm:constrLst/>
+                  <dgm:ruleLst/>
+                </dgm:layoutNode>
+                <dgm:layoutNode name="descendantArrow">
+                  <dgm:choose name="Name26">
+                    <dgm:if name="Name27" func="var" arg="dir" op="equ" val="norm">
+                      <dgm:alg type="lin"/>
+                    </dgm:if>
+                    <dgm:else name="Name28">
+                      <dgm:alg type="lin">
+                        <dgm:param type="linDir" val="fromR"/>
+                      </dgm:alg>
+                    </dgm:else>
+                  </dgm:choose>
+                  <dgm:shape xmlns:r="http://schemas.openxmlformats.org/officeDocument/2006/relationships" r:blip="">
+                    <dgm:adjLst/>
+                  </dgm:shape>
+                  <dgm:presOf/>
+                  <dgm:constrLst>
+                    <dgm:constr type="w" for="ch" forName="childTextArrow" refType="w"/>
+                    <dgm:constr type="h" for="ch" forName="childTextArrow" refType="h"/>
+                  </dgm:constrLst>
+                  <dgm:ruleLst/>
+                  <dgm:forEach name="Name29" axis="ch" ptType="node">
+                    <dgm:layoutNode name="childTextArrow" styleLbl="fgAccFollowNode1">
+                      <dgm:varLst>
+                        <dgm:bulletEnabled val="1"/>
+                      </dgm:varLst>
+                      <dgm:alg type="tx"/>
+                      <dgm:shape xmlns:r="http://schemas.openxmlformats.org/officeDocument/2006/relationships" type="rect" r:blip="">
+                        <dgm:adjLst/>
+                      </dgm:shape>
+                      <dgm:presOf axis="desOrSelf" ptType="node"/>
+                      <dgm:constrLst>
+                        <dgm:constr type="tMarg" refType="primFontSz" fact="0.1"/>
+                        <dgm:constr type="bMarg" refType="primFontSz" fact="0.1"/>
+                      </dgm:constrLst>
+                      <dgm:ruleLst>
+                        <dgm:rule type="primFontSz" val="5" fact="NaN" max="NaN"/>
+                      </dgm:ruleLst>
+                    </dgm:layoutNode>
+                  </dgm:forEach>
+                </dgm:layoutNode>
+              </dgm:if>
+              <dgm:else name="Name30"/>
+            </dgm:choose>
+          </dgm:layoutNode>
+        </dgm:else>
+      </dgm:choose>
+      <dgm:forEach name="Name31" axis="precedSib" ptType="sibTrans" st="-1" cnt="1">
+        <dgm:layoutNode name="sp">
+          <dgm:alg type="sp"/>
+          <dgm:shape xmlns:r="http://schemas.openxmlformats.org/officeDocument/2006/relationships" r:blip="">
+            <dgm:adjLst/>
+          </dgm:shape>
+          <dgm:presOf axis="self"/>
+          <dgm:constrLst/>
+          <dgm:ruleLst/>
+        </dgm:layoutNode>
+      </dgm:forEach>
+    </dgm:forEach>
+  </dgm:layoutNode>
+</dgm:layoutDef>
+</file>
+
 <file path=ppt/diagrams/quickStyle1.xml><?xml version="1.0" encoding="utf-8"?>
 <dgm:styleDef xmlns:dgm="http://schemas.openxmlformats.org/drawingml/2006/diagram" xmlns:a="http://schemas.openxmlformats.org/drawingml/2006/main" uniqueId="urn:microsoft.com/office/officeart/2005/8/quickstyle/simple4">
   <dgm:title val=""/>
@@ -6173,6 +7615,1040 @@
         <a:scrgbClr r="0" g="0" b="0"/>
       </a:fillRef>
       <a:effectRef idx="0">
+        <a:scrgbClr r="0" g="0" b="0"/>
+      </a:effectRef>
+      <a:fontRef idx="minor"/>
+    </dgm:style>
+  </dgm:styleLbl>
+  <dgm:styleLbl name="revTx">
+    <dgm:scene3d>
+      <a:camera prst="orthographicFront"/>
+      <a:lightRig rig="threePt" dir="t"/>
+    </dgm:scene3d>
+    <dgm:sp3d/>
+    <dgm:txPr/>
+    <dgm:style>
+      <a:lnRef idx="0">
+        <a:scrgbClr r="0" g="0" b="0"/>
+      </a:lnRef>
+      <a:fillRef idx="0">
+        <a:scrgbClr r="0" g="0" b="0"/>
+      </a:fillRef>
+      <a:effectRef idx="0">
+        <a:scrgbClr r="0" g="0" b="0"/>
+      </a:effectRef>
+      <a:fontRef idx="minor"/>
+    </dgm:style>
+  </dgm:styleLbl>
+</dgm:styleDef>
+</file>
+
+<file path=ppt/diagrams/quickStyle3.xml><?xml version="1.0" encoding="utf-8"?>
+<dgm:styleDef xmlns:dgm="http://schemas.openxmlformats.org/drawingml/2006/diagram" xmlns:a="http://schemas.openxmlformats.org/drawingml/2006/main" uniqueId="urn:microsoft.com/office/officeart/2005/8/quickstyle/simple2">
+  <dgm:title val=""/>
+  <dgm:desc val=""/>
+  <dgm:catLst>
+    <dgm:cat type="simple" pri="10200"/>
+  </dgm:catLst>
+  <dgm:scene3d>
+    <a:camera prst="orthographicFront"/>
+    <a:lightRig rig="threePt" dir="t"/>
+  </dgm:scene3d>
+  <dgm:styleLbl name="node0">
+    <dgm:scene3d>
+      <a:camera prst="orthographicFront"/>
+      <a:lightRig rig="threePt" dir="t"/>
+    </dgm:scene3d>
+    <dgm:sp3d/>
+    <dgm:txPr/>
+    <dgm:style>
+      <a:lnRef idx="3">
+        <a:scrgbClr r="0" g="0" b="0"/>
+      </a:lnRef>
+      <a:fillRef idx="1">
+        <a:scrgbClr r="0" g="0" b="0"/>
+      </a:fillRef>
+      <a:effectRef idx="1">
+        <a:scrgbClr r="0" g="0" b="0"/>
+      </a:effectRef>
+      <a:fontRef idx="minor">
+        <a:schemeClr val="lt1"/>
+      </a:fontRef>
+    </dgm:style>
+  </dgm:styleLbl>
+  <dgm:styleLbl name="lnNode1">
+    <dgm:scene3d>
+      <a:camera prst="orthographicFront"/>
+      <a:lightRig rig="threePt" dir="t"/>
+    </dgm:scene3d>
+    <dgm:sp3d/>
+    <dgm:txPr/>
+    <dgm:style>
+      <a:lnRef idx="3">
+        <a:scrgbClr r="0" g="0" b="0"/>
+      </a:lnRef>
+      <a:fillRef idx="1">
+        <a:scrgbClr r="0" g="0" b="0"/>
+      </a:fillRef>
+      <a:effectRef idx="1">
+        <a:scrgbClr r="0" g="0" b="0"/>
+      </a:effectRef>
+      <a:fontRef idx="minor">
+        <a:schemeClr val="lt1"/>
+      </a:fontRef>
+    </dgm:style>
+  </dgm:styleLbl>
+  <dgm:styleLbl name="vennNode1">
+    <dgm:scene3d>
+      <a:camera prst="orthographicFront"/>
+      <a:lightRig rig="threePt" dir="t"/>
+    </dgm:scene3d>
+    <dgm:sp3d/>
+    <dgm:txPr/>
+    <dgm:style>
+      <a:lnRef idx="3">
+        <a:scrgbClr r="0" g="0" b="0"/>
+      </a:lnRef>
+      <a:fillRef idx="1">
+        <a:scrgbClr r="0" g="0" b="0"/>
+      </a:fillRef>
+      <a:effectRef idx="0">
+        <a:scrgbClr r="0" g="0" b="0"/>
+      </a:effectRef>
+      <a:fontRef idx="minor">
+        <a:schemeClr val="tx1"/>
+      </a:fontRef>
+    </dgm:style>
+  </dgm:styleLbl>
+  <dgm:styleLbl name="alignNode1">
+    <dgm:scene3d>
+      <a:camera prst="orthographicFront"/>
+      <a:lightRig rig="threePt" dir="t"/>
+    </dgm:scene3d>
+    <dgm:sp3d/>
+    <dgm:txPr/>
+    <dgm:style>
+      <a:lnRef idx="2">
+        <a:scrgbClr r="0" g="0" b="0"/>
+      </a:lnRef>
+      <a:fillRef idx="1">
+        <a:scrgbClr r="0" g="0" b="0"/>
+      </a:fillRef>
+      <a:effectRef idx="1">
+        <a:scrgbClr r="0" g="0" b="0"/>
+      </a:effectRef>
+      <a:fontRef idx="minor">
+        <a:schemeClr val="lt1"/>
+      </a:fontRef>
+    </dgm:style>
+  </dgm:styleLbl>
+  <dgm:styleLbl name="node1">
+    <dgm:scene3d>
+      <a:camera prst="orthographicFront"/>
+      <a:lightRig rig="threePt" dir="t"/>
+    </dgm:scene3d>
+    <dgm:sp3d/>
+    <dgm:txPr/>
+    <dgm:style>
+      <a:lnRef idx="3">
+        <a:scrgbClr r="0" g="0" b="0"/>
+      </a:lnRef>
+      <a:fillRef idx="1">
+        <a:scrgbClr r="0" g="0" b="0"/>
+      </a:fillRef>
+      <a:effectRef idx="1">
+        <a:scrgbClr r="0" g="0" b="0"/>
+      </a:effectRef>
+      <a:fontRef idx="minor">
+        <a:schemeClr val="lt1"/>
+      </a:fontRef>
+    </dgm:style>
+  </dgm:styleLbl>
+  <dgm:styleLbl name="node2">
+    <dgm:scene3d>
+      <a:camera prst="orthographicFront"/>
+      <a:lightRig rig="threePt" dir="t"/>
+    </dgm:scene3d>
+    <dgm:sp3d/>
+    <dgm:txPr/>
+    <dgm:style>
+      <a:lnRef idx="3">
+        <a:scrgbClr r="0" g="0" b="0"/>
+      </a:lnRef>
+      <a:fillRef idx="1">
+        <a:scrgbClr r="0" g="0" b="0"/>
+      </a:fillRef>
+      <a:effectRef idx="1">
+        <a:scrgbClr r="0" g="0" b="0"/>
+      </a:effectRef>
+      <a:fontRef idx="minor">
+        <a:schemeClr val="lt1"/>
+      </a:fontRef>
+    </dgm:style>
+  </dgm:styleLbl>
+  <dgm:styleLbl name="node3">
+    <dgm:scene3d>
+      <a:camera prst="orthographicFront"/>
+      <a:lightRig rig="threePt" dir="t"/>
+    </dgm:scene3d>
+    <dgm:sp3d/>
+    <dgm:txPr/>
+    <dgm:style>
+      <a:lnRef idx="3">
+        <a:scrgbClr r="0" g="0" b="0"/>
+      </a:lnRef>
+      <a:fillRef idx="1">
+        <a:scrgbClr r="0" g="0" b="0"/>
+      </a:fillRef>
+      <a:effectRef idx="1">
+        <a:scrgbClr r="0" g="0" b="0"/>
+      </a:effectRef>
+      <a:fontRef idx="minor">
+        <a:schemeClr val="lt1"/>
+      </a:fontRef>
+    </dgm:style>
+  </dgm:styleLbl>
+  <dgm:styleLbl name="node4">
+    <dgm:scene3d>
+      <a:camera prst="orthographicFront"/>
+      <a:lightRig rig="threePt" dir="t"/>
+    </dgm:scene3d>
+    <dgm:sp3d/>
+    <dgm:txPr/>
+    <dgm:style>
+      <a:lnRef idx="3">
+        <a:scrgbClr r="0" g="0" b="0"/>
+      </a:lnRef>
+      <a:fillRef idx="1">
+        <a:scrgbClr r="0" g="0" b="0"/>
+      </a:fillRef>
+      <a:effectRef idx="1">
+        <a:scrgbClr r="0" g="0" b="0"/>
+      </a:effectRef>
+      <a:fontRef idx="minor">
+        <a:schemeClr val="lt1"/>
+      </a:fontRef>
+    </dgm:style>
+  </dgm:styleLbl>
+  <dgm:styleLbl name="fgImgPlace1">
+    <dgm:scene3d>
+      <a:camera prst="orthographicFront"/>
+      <a:lightRig rig="threePt" dir="t"/>
+    </dgm:scene3d>
+    <dgm:sp3d/>
+    <dgm:txPr/>
+    <dgm:style>
+      <a:lnRef idx="3">
+        <a:scrgbClr r="0" g="0" b="0"/>
+      </a:lnRef>
+      <a:fillRef idx="1">
+        <a:scrgbClr r="0" g="0" b="0"/>
+      </a:fillRef>
+      <a:effectRef idx="1">
+        <a:scrgbClr r="0" g="0" b="0"/>
+      </a:effectRef>
+      <a:fontRef idx="minor"/>
+    </dgm:style>
+  </dgm:styleLbl>
+  <dgm:styleLbl name="alignImgPlace1">
+    <dgm:scene3d>
+      <a:camera prst="orthographicFront"/>
+      <a:lightRig rig="threePt" dir="t"/>
+    </dgm:scene3d>
+    <dgm:sp3d/>
+    <dgm:txPr/>
+    <dgm:style>
+      <a:lnRef idx="3">
+        <a:scrgbClr r="0" g="0" b="0"/>
+      </a:lnRef>
+      <a:fillRef idx="1">
+        <a:scrgbClr r="0" g="0" b="0"/>
+      </a:fillRef>
+      <a:effectRef idx="1">
+        <a:scrgbClr r="0" g="0" b="0"/>
+      </a:effectRef>
+      <a:fontRef idx="minor"/>
+    </dgm:style>
+  </dgm:styleLbl>
+  <dgm:styleLbl name="bgImgPlace1">
+    <dgm:scene3d>
+      <a:camera prst="orthographicFront"/>
+      <a:lightRig rig="threePt" dir="t"/>
+    </dgm:scene3d>
+    <dgm:sp3d/>
+    <dgm:txPr/>
+    <dgm:style>
+      <a:lnRef idx="3">
+        <a:scrgbClr r="0" g="0" b="0"/>
+      </a:lnRef>
+      <a:fillRef idx="1">
+        <a:scrgbClr r="0" g="0" b="0"/>
+      </a:fillRef>
+      <a:effectRef idx="1">
+        <a:scrgbClr r="0" g="0" b="0"/>
+      </a:effectRef>
+      <a:fontRef idx="minor"/>
+    </dgm:style>
+  </dgm:styleLbl>
+  <dgm:styleLbl name="sibTrans2D1">
+    <dgm:scene3d>
+      <a:camera prst="orthographicFront"/>
+      <a:lightRig rig="threePt" dir="t"/>
+    </dgm:scene3d>
+    <dgm:sp3d/>
+    <dgm:txPr/>
+    <dgm:style>
+      <a:lnRef idx="0">
+        <a:scrgbClr r="0" g="0" b="0"/>
+      </a:lnRef>
+      <a:fillRef idx="1">
+        <a:scrgbClr r="0" g="0" b="0"/>
+      </a:fillRef>
+      <a:effectRef idx="1">
+        <a:scrgbClr r="0" g="0" b="0"/>
+      </a:effectRef>
+      <a:fontRef idx="minor">
+        <a:schemeClr val="lt1"/>
+      </a:fontRef>
+    </dgm:style>
+  </dgm:styleLbl>
+  <dgm:styleLbl name="fgSibTrans2D1">
+    <dgm:scene3d>
+      <a:camera prst="orthographicFront"/>
+      <a:lightRig rig="threePt" dir="t"/>
+    </dgm:scene3d>
+    <dgm:sp3d/>
+    <dgm:txPr/>
+    <dgm:style>
+      <a:lnRef idx="0">
+        <a:scrgbClr r="0" g="0" b="0"/>
+      </a:lnRef>
+      <a:fillRef idx="1">
+        <a:scrgbClr r="0" g="0" b="0"/>
+      </a:fillRef>
+      <a:effectRef idx="1">
+        <a:scrgbClr r="0" g="0" b="0"/>
+      </a:effectRef>
+      <a:fontRef idx="minor">
+        <a:schemeClr val="lt1"/>
+      </a:fontRef>
+    </dgm:style>
+  </dgm:styleLbl>
+  <dgm:styleLbl name="bgSibTrans2D1">
+    <dgm:scene3d>
+      <a:camera prst="orthographicFront"/>
+      <a:lightRig rig="threePt" dir="t"/>
+    </dgm:scene3d>
+    <dgm:sp3d/>
+    <dgm:txPr/>
+    <dgm:style>
+      <a:lnRef idx="0">
+        <a:scrgbClr r="0" g="0" b="0"/>
+      </a:lnRef>
+      <a:fillRef idx="1">
+        <a:scrgbClr r="0" g="0" b="0"/>
+      </a:fillRef>
+      <a:effectRef idx="1">
+        <a:scrgbClr r="0" g="0" b="0"/>
+      </a:effectRef>
+      <a:fontRef idx="minor">
+        <a:schemeClr val="lt1"/>
+      </a:fontRef>
+    </dgm:style>
+  </dgm:styleLbl>
+  <dgm:styleLbl name="sibTrans1D1">
+    <dgm:scene3d>
+      <a:camera prst="orthographicFront"/>
+      <a:lightRig rig="threePt" dir="t"/>
+    </dgm:scene3d>
+    <dgm:sp3d/>
+    <dgm:txPr/>
+    <dgm:style>
+      <a:lnRef idx="1">
+        <a:scrgbClr r="0" g="0" b="0"/>
+      </a:lnRef>
+      <a:fillRef idx="0">
+        <a:scrgbClr r="0" g="0" b="0"/>
+      </a:fillRef>
+      <a:effectRef idx="0">
+        <a:scrgbClr r="0" g="0" b="0"/>
+      </a:effectRef>
+      <a:fontRef idx="minor"/>
+    </dgm:style>
+  </dgm:styleLbl>
+  <dgm:styleLbl name="callout">
+    <dgm:scene3d>
+      <a:camera prst="orthographicFront"/>
+      <a:lightRig rig="threePt" dir="t"/>
+    </dgm:scene3d>
+    <dgm:sp3d/>
+    <dgm:txPr/>
+    <dgm:style>
+      <a:lnRef idx="2">
+        <a:scrgbClr r="0" g="0" b="0"/>
+      </a:lnRef>
+      <a:fillRef idx="1">
+        <a:scrgbClr r="0" g="0" b="0"/>
+      </a:fillRef>
+      <a:effectRef idx="1">
+        <a:scrgbClr r="0" g="0" b="0"/>
+      </a:effectRef>
+      <a:fontRef idx="minor"/>
+    </dgm:style>
+  </dgm:styleLbl>
+  <dgm:styleLbl name="asst0">
+    <dgm:scene3d>
+      <a:camera prst="orthographicFront"/>
+      <a:lightRig rig="threePt" dir="t"/>
+    </dgm:scene3d>
+    <dgm:sp3d/>
+    <dgm:txPr/>
+    <dgm:style>
+      <a:lnRef idx="3">
+        <a:scrgbClr r="0" g="0" b="0"/>
+      </a:lnRef>
+      <a:fillRef idx="1">
+        <a:scrgbClr r="0" g="0" b="0"/>
+      </a:fillRef>
+      <a:effectRef idx="1">
+        <a:scrgbClr r="0" g="0" b="0"/>
+      </a:effectRef>
+      <a:fontRef idx="minor">
+        <a:schemeClr val="lt1"/>
+      </a:fontRef>
+    </dgm:style>
+  </dgm:styleLbl>
+  <dgm:styleLbl name="asst1">
+    <dgm:scene3d>
+      <a:camera prst="orthographicFront"/>
+      <a:lightRig rig="threePt" dir="t"/>
+    </dgm:scene3d>
+    <dgm:sp3d/>
+    <dgm:txPr/>
+    <dgm:style>
+      <a:lnRef idx="3">
+        <a:scrgbClr r="0" g="0" b="0"/>
+      </a:lnRef>
+      <a:fillRef idx="1">
+        <a:scrgbClr r="0" g="0" b="0"/>
+      </a:fillRef>
+      <a:effectRef idx="1">
+        <a:scrgbClr r="0" g="0" b="0"/>
+      </a:effectRef>
+      <a:fontRef idx="minor">
+        <a:schemeClr val="lt1"/>
+      </a:fontRef>
+    </dgm:style>
+  </dgm:styleLbl>
+  <dgm:styleLbl name="asst2">
+    <dgm:scene3d>
+      <a:camera prst="orthographicFront"/>
+      <a:lightRig rig="threePt" dir="t"/>
+    </dgm:scene3d>
+    <dgm:sp3d/>
+    <dgm:txPr/>
+    <dgm:style>
+      <a:lnRef idx="3">
+        <a:scrgbClr r="0" g="0" b="0"/>
+      </a:lnRef>
+      <a:fillRef idx="1">
+        <a:scrgbClr r="0" g="0" b="0"/>
+      </a:fillRef>
+      <a:effectRef idx="1">
+        <a:scrgbClr r="0" g="0" b="0"/>
+      </a:effectRef>
+      <a:fontRef idx="minor">
+        <a:schemeClr val="lt1"/>
+      </a:fontRef>
+    </dgm:style>
+  </dgm:styleLbl>
+  <dgm:styleLbl name="asst3">
+    <dgm:scene3d>
+      <a:camera prst="orthographicFront"/>
+      <a:lightRig rig="threePt" dir="t"/>
+    </dgm:scene3d>
+    <dgm:sp3d/>
+    <dgm:txPr/>
+    <dgm:style>
+      <a:lnRef idx="3">
+        <a:scrgbClr r="0" g="0" b="0"/>
+      </a:lnRef>
+      <a:fillRef idx="1">
+        <a:scrgbClr r="0" g="0" b="0"/>
+      </a:fillRef>
+      <a:effectRef idx="1">
+        <a:scrgbClr r="0" g="0" b="0"/>
+      </a:effectRef>
+      <a:fontRef idx="minor">
+        <a:schemeClr val="lt1"/>
+      </a:fontRef>
+    </dgm:style>
+  </dgm:styleLbl>
+  <dgm:styleLbl name="asst4">
+    <dgm:scene3d>
+      <a:camera prst="orthographicFront"/>
+      <a:lightRig rig="threePt" dir="t"/>
+    </dgm:scene3d>
+    <dgm:sp3d/>
+    <dgm:txPr/>
+    <dgm:style>
+      <a:lnRef idx="3">
+        <a:scrgbClr r="0" g="0" b="0"/>
+      </a:lnRef>
+      <a:fillRef idx="1">
+        <a:scrgbClr r="0" g="0" b="0"/>
+      </a:fillRef>
+      <a:effectRef idx="1">
+        <a:scrgbClr r="0" g="0" b="0"/>
+      </a:effectRef>
+      <a:fontRef idx="minor">
+        <a:schemeClr val="lt1"/>
+      </a:fontRef>
+    </dgm:style>
+  </dgm:styleLbl>
+  <dgm:styleLbl name="parChTrans2D1">
+    <dgm:scene3d>
+      <a:camera prst="orthographicFront"/>
+      <a:lightRig rig="threePt" dir="t"/>
+    </dgm:scene3d>
+    <dgm:sp3d/>
+    <dgm:txPr/>
+    <dgm:style>
+      <a:lnRef idx="3">
+        <a:scrgbClr r="0" g="0" b="0"/>
+      </a:lnRef>
+      <a:fillRef idx="1">
+        <a:scrgbClr r="0" g="0" b="0"/>
+      </a:fillRef>
+      <a:effectRef idx="1">
+        <a:scrgbClr r="0" g="0" b="0"/>
+      </a:effectRef>
+      <a:fontRef idx="minor">
+        <a:schemeClr val="lt1"/>
+      </a:fontRef>
+    </dgm:style>
+  </dgm:styleLbl>
+  <dgm:styleLbl name="parChTrans2D2">
+    <dgm:scene3d>
+      <a:camera prst="orthographicFront"/>
+      <a:lightRig rig="threePt" dir="t"/>
+    </dgm:scene3d>
+    <dgm:sp3d/>
+    <dgm:txPr/>
+    <dgm:style>
+      <a:lnRef idx="3">
+        <a:scrgbClr r="0" g="0" b="0"/>
+      </a:lnRef>
+      <a:fillRef idx="1">
+        <a:scrgbClr r="0" g="0" b="0"/>
+      </a:fillRef>
+      <a:effectRef idx="1">
+        <a:scrgbClr r="0" g="0" b="0"/>
+      </a:effectRef>
+      <a:fontRef idx="minor">
+        <a:schemeClr val="lt1"/>
+      </a:fontRef>
+    </dgm:style>
+  </dgm:styleLbl>
+  <dgm:styleLbl name="parChTrans2D3">
+    <dgm:scene3d>
+      <a:camera prst="orthographicFront"/>
+      <a:lightRig rig="threePt" dir="t"/>
+    </dgm:scene3d>
+    <dgm:sp3d/>
+    <dgm:txPr/>
+    <dgm:style>
+      <a:lnRef idx="3">
+        <a:scrgbClr r="0" g="0" b="0"/>
+      </a:lnRef>
+      <a:fillRef idx="1">
+        <a:scrgbClr r="0" g="0" b="0"/>
+      </a:fillRef>
+      <a:effectRef idx="1">
+        <a:scrgbClr r="0" g="0" b="0"/>
+      </a:effectRef>
+      <a:fontRef idx="minor">
+        <a:schemeClr val="lt1"/>
+      </a:fontRef>
+    </dgm:style>
+  </dgm:styleLbl>
+  <dgm:styleLbl name="parChTrans2D4">
+    <dgm:scene3d>
+      <a:camera prst="orthographicFront"/>
+      <a:lightRig rig="threePt" dir="t"/>
+    </dgm:scene3d>
+    <dgm:sp3d/>
+    <dgm:txPr/>
+    <dgm:style>
+      <a:lnRef idx="3">
+        <a:scrgbClr r="0" g="0" b="0"/>
+      </a:lnRef>
+      <a:fillRef idx="1">
+        <a:scrgbClr r="0" g="0" b="0"/>
+      </a:fillRef>
+      <a:effectRef idx="1">
+        <a:scrgbClr r="0" g="0" b="0"/>
+      </a:effectRef>
+      <a:fontRef idx="minor">
+        <a:schemeClr val="lt1"/>
+      </a:fontRef>
+    </dgm:style>
+  </dgm:styleLbl>
+  <dgm:styleLbl name="parChTrans1D1">
+    <dgm:scene3d>
+      <a:camera prst="orthographicFront"/>
+      <a:lightRig rig="threePt" dir="t"/>
+    </dgm:scene3d>
+    <dgm:sp3d/>
+    <dgm:txPr/>
+    <dgm:style>
+      <a:lnRef idx="2">
+        <a:scrgbClr r="0" g="0" b="0"/>
+      </a:lnRef>
+      <a:fillRef idx="0">
+        <a:scrgbClr r="0" g="0" b="0"/>
+      </a:fillRef>
+      <a:effectRef idx="0">
+        <a:scrgbClr r="0" g="0" b="0"/>
+      </a:effectRef>
+      <a:fontRef idx="minor"/>
+    </dgm:style>
+  </dgm:styleLbl>
+  <dgm:styleLbl name="parChTrans1D2">
+    <dgm:scene3d>
+      <a:camera prst="orthographicFront"/>
+      <a:lightRig rig="threePt" dir="t"/>
+    </dgm:scene3d>
+    <dgm:sp3d/>
+    <dgm:txPr/>
+    <dgm:style>
+      <a:lnRef idx="2">
+        <a:scrgbClr r="0" g="0" b="0"/>
+      </a:lnRef>
+      <a:fillRef idx="0">
+        <a:scrgbClr r="0" g="0" b="0"/>
+      </a:fillRef>
+      <a:effectRef idx="0">
+        <a:scrgbClr r="0" g="0" b="0"/>
+      </a:effectRef>
+      <a:fontRef idx="minor"/>
+    </dgm:style>
+  </dgm:styleLbl>
+  <dgm:styleLbl name="parChTrans1D3">
+    <dgm:scene3d>
+      <a:camera prst="orthographicFront"/>
+      <a:lightRig rig="threePt" dir="t"/>
+    </dgm:scene3d>
+    <dgm:sp3d/>
+    <dgm:txPr/>
+    <dgm:style>
+      <a:lnRef idx="2">
+        <a:scrgbClr r="0" g="0" b="0"/>
+      </a:lnRef>
+      <a:fillRef idx="0">
+        <a:scrgbClr r="0" g="0" b="0"/>
+      </a:fillRef>
+      <a:effectRef idx="0">
+        <a:scrgbClr r="0" g="0" b="0"/>
+      </a:effectRef>
+      <a:fontRef idx="minor"/>
+    </dgm:style>
+  </dgm:styleLbl>
+  <dgm:styleLbl name="parChTrans1D4">
+    <dgm:scene3d>
+      <a:camera prst="orthographicFront"/>
+      <a:lightRig rig="threePt" dir="t"/>
+    </dgm:scene3d>
+    <dgm:sp3d/>
+    <dgm:txPr/>
+    <dgm:style>
+      <a:lnRef idx="2">
+        <a:scrgbClr r="0" g="0" b="0"/>
+      </a:lnRef>
+      <a:fillRef idx="0">
+        <a:scrgbClr r="0" g="0" b="0"/>
+      </a:fillRef>
+      <a:effectRef idx="0">
+        <a:scrgbClr r="0" g="0" b="0"/>
+      </a:effectRef>
+      <a:fontRef idx="minor"/>
+    </dgm:style>
+  </dgm:styleLbl>
+  <dgm:styleLbl name="fgAcc1">
+    <dgm:scene3d>
+      <a:camera prst="orthographicFront"/>
+      <a:lightRig rig="threePt" dir="t"/>
+    </dgm:scene3d>
+    <dgm:sp3d/>
+    <dgm:txPr/>
+    <dgm:style>
+      <a:lnRef idx="2">
+        <a:scrgbClr r="0" g="0" b="0"/>
+      </a:lnRef>
+      <a:fillRef idx="1">
+        <a:scrgbClr r="0" g="0" b="0"/>
+      </a:fillRef>
+      <a:effectRef idx="0">
+        <a:scrgbClr r="0" g="0" b="0"/>
+      </a:effectRef>
+      <a:fontRef idx="minor"/>
+    </dgm:style>
+  </dgm:styleLbl>
+  <dgm:styleLbl name="conFgAcc1">
+    <dgm:scene3d>
+      <a:camera prst="orthographicFront"/>
+      <a:lightRig rig="threePt" dir="t"/>
+    </dgm:scene3d>
+    <dgm:sp3d/>
+    <dgm:txPr/>
+    <dgm:style>
+      <a:lnRef idx="2">
+        <a:scrgbClr r="0" g="0" b="0"/>
+      </a:lnRef>
+      <a:fillRef idx="1">
+        <a:scrgbClr r="0" g="0" b="0"/>
+      </a:fillRef>
+      <a:effectRef idx="0">
+        <a:scrgbClr r="0" g="0" b="0"/>
+      </a:effectRef>
+      <a:fontRef idx="minor"/>
+    </dgm:style>
+  </dgm:styleLbl>
+  <dgm:styleLbl name="alignAcc1">
+    <dgm:scene3d>
+      <a:camera prst="orthographicFront"/>
+      <a:lightRig rig="threePt" dir="t"/>
+    </dgm:scene3d>
+    <dgm:sp3d/>
+    <dgm:txPr/>
+    <dgm:style>
+      <a:lnRef idx="2">
+        <a:scrgbClr r="0" g="0" b="0"/>
+      </a:lnRef>
+      <a:fillRef idx="1">
+        <a:scrgbClr r="0" g="0" b="0"/>
+      </a:fillRef>
+      <a:effectRef idx="0">
+        <a:scrgbClr r="0" g="0" b="0"/>
+      </a:effectRef>
+      <a:fontRef idx="minor"/>
+    </dgm:style>
+  </dgm:styleLbl>
+  <dgm:styleLbl name="trAlignAcc1">
+    <dgm:scene3d>
+      <a:camera prst="orthographicFront"/>
+      <a:lightRig rig="threePt" dir="t"/>
+    </dgm:scene3d>
+    <dgm:sp3d/>
+    <dgm:txPr/>
+    <dgm:style>
+      <a:lnRef idx="1">
+        <a:scrgbClr r="0" g="0" b="0"/>
+      </a:lnRef>
+      <a:fillRef idx="1">
+        <a:scrgbClr r="0" g="0" b="0"/>
+      </a:fillRef>
+      <a:effectRef idx="0">
+        <a:scrgbClr r="0" g="0" b="0"/>
+      </a:effectRef>
+      <a:fontRef idx="minor"/>
+    </dgm:style>
+  </dgm:styleLbl>
+  <dgm:styleLbl name="bgAcc1">
+    <dgm:scene3d>
+      <a:camera prst="orthographicFront"/>
+      <a:lightRig rig="threePt" dir="t"/>
+    </dgm:scene3d>
+    <dgm:sp3d/>
+    <dgm:txPr/>
+    <dgm:style>
+      <a:lnRef idx="2">
+        <a:scrgbClr r="0" g="0" b="0"/>
+      </a:lnRef>
+      <a:fillRef idx="1">
+        <a:scrgbClr r="0" g="0" b="0"/>
+      </a:fillRef>
+      <a:effectRef idx="0">
+        <a:scrgbClr r="0" g="0" b="0"/>
+      </a:effectRef>
+      <a:fontRef idx="minor"/>
+    </dgm:style>
+  </dgm:styleLbl>
+  <dgm:styleLbl name="solidFgAcc1">
+    <dgm:scene3d>
+      <a:camera prst="orthographicFront"/>
+      <a:lightRig rig="threePt" dir="t"/>
+    </dgm:scene3d>
+    <dgm:sp3d/>
+    <dgm:txPr/>
+    <dgm:style>
+      <a:lnRef idx="2">
+        <a:scrgbClr r="0" g="0" b="0"/>
+      </a:lnRef>
+      <a:fillRef idx="1">
+        <a:scrgbClr r="0" g="0" b="0"/>
+      </a:fillRef>
+      <a:effectRef idx="0">
+        <a:scrgbClr r="0" g="0" b="0"/>
+      </a:effectRef>
+      <a:fontRef idx="minor"/>
+    </dgm:style>
+  </dgm:styleLbl>
+  <dgm:styleLbl name="solidAlignAcc1">
+    <dgm:scene3d>
+      <a:camera prst="orthographicFront"/>
+      <a:lightRig rig="threePt" dir="t"/>
+    </dgm:scene3d>
+    <dgm:sp3d/>
+    <dgm:txPr/>
+    <dgm:style>
+      <a:lnRef idx="2">
+        <a:scrgbClr r="0" g="0" b="0"/>
+      </a:lnRef>
+      <a:fillRef idx="1">
+        <a:scrgbClr r="0" g="0" b="0"/>
+      </a:fillRef>
+      <a:effectRef idx="0">
+        <a:scrgbClr r="0" g="0" b="0"/>
+      </a:effectRef>
+      <a:fontRef idx="minor"/>
+    </dgm:style>
+  </dgm:styleLbl>
+  <dgm:styleLbl name="solidBgAcc1">
+    <dgm:scene3d>
+      <a:camera prst="orthographicFront"/>
+      <a:lightRig rig="threePt" dir="t"/>
+    </dgm:scene3d>
+    <dgm:sp3d/>
+    <dgm:txPr/>
+    <dgm:style>
+      <a:lnRef idx="2">
+        <a:scrgbClr r="0" g="0" b="0"/>
+      </a:lnRef>
+      <a:fillRef idx="1">
+        <a:scrgbClr r="0" g="0" b="0"/>
+      </a:fillRef>
+      <a:effectRef idx="0">
+        <a:scrgbClr r="0" g="0" b="0"/>
+      </a:effectRef>
+      <a:fontRef idx="minor"/>
+    </dgm:style>
+  </dgm:styleLbl>
+  <dgm:styleLbl name="fgAccFollowNode1">
+    <dgm:scene3d>
+      <a:camera prst="orthographicFront"/>
+      <a:lightRig rig="threePt" dir="t"/>
+    </dgm:scene3d>
+    <dgm:sp3d/>
+    <dgm:txPr/>
+    <dgm:style>
+      <a:lnRef idx="2">
+        <a:scrgbClr r="0" g="0" b="0"/>
+      </a:lnRef>
+      <a:fillRef idx="1">
+        <a:scrgbClr r="0" g="0" b="0"/>
+      </a:fillRef>
+      <a:effectRef idx="0">
+        <a:scrgbClr r="0" g="0" b="0"/>
+      </a:effectRef>
+      <a:fontRef idx="minor"/>
+    </dgm:style>
+  </dgm:styleLbl>
+  <dgm:styleLbl name="alignAccFollowNode1">
+    <dgm:scene3d>
+      <a:camera prst="orthographicFront"/>
+      <a:lightRig rig="threePt" dir="t"/>
+    </dgm:scene3d>
+    <dgm:sp3d/>
+    <dgm:txPr/>
+    <dgm:style>
+      <a:lnRef idx="2">
+        <a:scrgbClr r="0" g="0" b="0"/>
+      </a:lnRef>
+      <a:fillRef idx="1">
+        <a:scrgbClr r="0" g="0" b="0"/>
+      </a:fillRef>
+      <a:effectRef idx="0">
+        <a:scrgbClr r="0" g="0" b="0"/>
+      </a:effectRef>
+      <a:fontRef idx="minor"/>
+    </dgm:style>
+  </dgm:styleLbl>
+  <dgm:styleLbl name="bgAccFollowNode1">
+    <dgm:scene3d>
+      <a:camera prst="orthographicFront"/>
+      <a:lightRig rig="threePt" dir="t"/>
+    </dgm:scene3d>
+    <dgm:sp3d/>
+    <dgm:txPr/>
+    <dgm:style>
+      <a:lnRef idx="2">
+        <a:scrgbClr r="0" g="0" b="0"/>
+      </a:lnRef>
+      <a:fillRef idx="1">
+        <a:scrgbClr r="0" g="0" b="0"/>
+      </a:fillRef>
+      <a:effectRef idx="0">
+        <a:scrgbClr r="0" g="0" b="0"/>
+      </a:effectRef>
+      <a:fontRef idx="minor"/>
+    </dgm:style>
+  </dgm:styleLbl>
+  <dgm:styleLbl name="fgAcc0">
+    <dgm:scene3d>
+      <a:camera prst="orthographicFront"/>
+      <a:lightRig rig="threePt" dir="t"/>
+    </dgm:scene3d>
+    <dgm:sp3d/>
+    <dgm:txPr/>
+    <dgm:style>
+      <a:lnRef idx="2">
+        <a:scrgbClr r="0" g="0" b="0"/>
+      </a:lnRef>
+      <a:fillRef idx="1">
+        <a:scrgbClr r="0" g="0" b="0"/>
+      </a:fillRef>
+      <a:effectRef idx="0">
+        <a:scrgbClr r="0" g="0" b="0"/>
+      </a:effectRef>
+      <a:fontRef idx="minor"/>
+    </dgm:style>
+  </dgm:styleLbl>
+  <dgm:styleLbl name="fgAcc2">
+    <dgm:scene3d>
+      <a:camera prst="orthographicFront"/>
+      <a:lightRig rig="threePt" dir="t"/>
+    </dgm:scene3d>
+    <dgm:sp3d/>
+    <dgm:txPr/>
+    <dgm:style>
+      <a:lnRef idx="2">
+        <a:scrgbClr r="0" g="0" b="0"/>
+      </a:lnRef>
+      <a:fillRef idx="1">
+        <a:scrgbClr r="0" g="0" b="0"/>
+      </a:fillRef>
+      <a:effectRef idx="0">
+        <a:scrgbClr r="0" g="0" b="0"/>
+      </a:effectRef>
+      <a:fontRef idx="minor"/>
+    </dgm:style>
+  </dgm:styleLbl>
+  <dgm:styleLbl name="fgAcc3">
+    <dgm:scene3d>
+      <a:camera prst="orthographicFront"/>
+      <a:lightRig rig="threePt" dir="t"/>
+    </dgm:scene3d>
+    <dgm:sp3d/>
+    <dgm:txPr/>
+    <dgm:style>
+      <a:lnRef idx="2">
+        <a:scrgbClr r="0" g="0" b="0"/>
+      </a:lnRef>
+      <a:fillRef idx="1">
+        <a:scrgbClr r="0" g="0" b="0"/>
+      </a:fillRef>
+      <a:effectRef idx="0">
+        <a:scrgbClr r="0" g="0" b="0"/>
+      </a:effectRef>
+      <a:fontRef idx="minor"/>
+    </dgm:style>
+  </dgm:styleLbl>
+  <dgm:styleLbl name="fgAcc4">
+    <dgm:scene3d>
+      <a:camera prst="orthographicFront"/>
+      <a:lightRig rig="threePt" dir="t"/>
+    </dgm:scene3d>
+    <dgm:sp3d/>
+    <dgm:txPr/>
+    <dgm:style>
+      <a:lnRef idx="2">
+        <a:scrgbClr r="0" g="0" b="0"/>
+      </a:lnRef>
+      <a:fillRef idx="1">
+        <a:scrgbClr r="0" g="0" b="0"/>
+      </a:fillRef>
+      <a:effectRef idx="0">
+        <a:scrgbClr r="0" g="0" b="0"/>
+      </a:effectRef>
+      <a:fontRef idx="minor"/>
+    </dgm:style>
+  </dgm:styleLbl>
+  <dgm:styleLbl name="bgShp">
+    <dgm:scene3d>
+      <a:camera prst="orthographicFront"/>
+      <a:lightRig rig="threePt" dir="t"/>
+    </dgm:scene3d>
+    <dgm:sp3d/>
+    <dgm:txPr/>
+    <dgm:style>
+      <a:lnRef idx="0">
+        <a:scrgbClr r="0" g="0" b="0"/>
+      </a:lnRef>
+      <a:fillRef idx="1">
+        <a:scrgbClr r="0" g="0" b="0"/>
+      </a:fillRef>
+      <a:effectRef idx="0">
+        <a:scrgbClr r="0" g="0" b="0"/>
+      </a:effectRef>
+      <a:fontRef idx="minor"/>
+    </dgm:style>
+  </dgm:styleLbl>
+  <dgm:styleLbl name="dkBgShp">
+    <dgm:scene3d>
+      <a:camera prst="orthographicFront"/>
+      <a:lightRig rig="threePt" dir="t"/>
+    </dgm:scene3d>
+    <dgm:sp3d/>
+    <dgm:txPr/>
+    <dgm:style>
+      <a:lnRef idx="0">
+        <a:scrgbClr r="0" g="0" b="0"/>
+      </a:lnRef>
+      <a:fillRef idx="1">
+        <a:scrgbClr r="0" g="0" b="0"/>
+      </a:fillRef>
+      <a:effectRef idx="0">
+        <a:scrgbClr r="0" g="0" b="0"/>
+      </a:effectRef>
+      <a:fontRef idx="minor"/>
+    </dgm:style>
+  </dgm:styleLbl>
+  <dgm:styleLbl name="trBgShp">
+    <dgm:scene3d>
+      <a:camera prst="orthographicFront"/>
+      <a:lightRig rig="threePt" dir="t"/>
+    </dgm:scene3d>
+    <dgm:sp3d/>
+    <dgm:txPr/>
+    <dgm:style>
+      <a:lnRef idx="0">
+        <a:scrgbClr r="0" g="0" b="0"/>
+      </a:lnRef>
+      <a:fillRef idx="1">
+        <a:scrgbClr r="0" g="0" b="0"/>
+      </a:fillRef>
+      <a:effectRef idx="0">
+        <a:scrgbClr r="0" g="0" b="0"/>
+      </a:effectRef>
+      <a:fontRef idx="minor"/>
+    </dgm:style>
+  </dgm:styleLbl>
+  <dgm:styleLbl name="fgShp">
+    <dgm:scene3d>
+      <a:camera prst="orthographicFront"/>
+      <a:lightRig rig="threePt" dir="t"/>
+    </dgm:scene3d>
+    <dgm:sp3d/>
+    <dgm:txPr/>
+    <dgm:style>
+      <a:lnRef idx="3">
+        <a:scrgbClr r="0" g="0" b="0"/>
+      </a:lnRef>
+      <a:fillRef idx="1">
+        <a:scrgbClr r="0" g="0" b="0"/>
+      </a:fillRef>
+      <a:effectRef idx="1">
         <a:scrgbClr r="0" g="0" b="0"/>
       </a:effectRef>
       <a:fontRef idx="minor"/>
@@ -6348,7 +8824,7 @@
           <a:p>
             <a:fld id="{CC52B196-69F7-5B49-9E8F-65111842FC39}" type="datetimeFigureOut">
               <a:rPr lang="en-US" smtClean="0"/>
-              <a:t>1/14/2019</a:t>
+              <a:t>1/16/2019</a:t>
             </a:fld>
             <a:endParaRPr lang="en-US"/>
           </a:p>
@@ -6546,7 +9022,7 @@
           <a:p>
             <a:fld id="{CC52B196-69F7-5B49-9E8F-65111842FC39}" type="datetimeFigureOut">
               <a:rPr lang="en-US" smtClean="0"/>
-              <a:t>1/14/2019</a:t>
+              <a:t>1/16/2019</a:t>
             </a:fld>
             <a:endParaRPr lang="en-US"/>
           </a:p>
@@ -6754,7 +9230,7 @@
           <a:p>
             <a:fld id="{CC52B196-69F7-5B49-9E8F-65111842FC39}" type="datetimeFigureOut">
               <a:rPr lang="en-US" smtClean="0"/>
-              <a:t>1/14/2019</a:t>
+              <a:t>1/16/2019</a:t>
             </a:fld>
             <a:endParaRPr lang="en-US"/>
           </a:p>
@@ -6952,7 +9428,7 @@
           <a:p>
             <a:fld id="{CC52B196-69F7-5B49-9E8F-65111842FC39}" type="datetimeFigureOut">
               <a:rPr lang="en-US" smtClean="0"/>
-              <a:t>1/14/2019</a:t>
+              <a:t>1/16/2019</a:t>
             </a:fld>
             <a:endParaRPr lang="en-US"/>
           </a:p>
@@ -7227,7 +9703,7 @@
           <a:p>
             <a:fld id="{CC52B196-69F7-5B49-9E8F-65111842FC39}" type="datetimeFigureOut">
               <a:rPr lang="en-US" smtClean="0"/>
-              <a:t>1/14/2019</a:t>
+              <a:t>1/16/2019</a:t>
             </a:fld>
             <a:endParaRPr lang="en-US"/>
           </a:p>
@@ -7492,7 +9968,7 @@
           <a:p>
             <a:fld id="{CC52B196-69F7-5B49-9E8F-65111842FC39}" type="datetimeFigureOut">
               <a:rPr lang="en-US" smtClean="0"/>
-              <a:t>1/14/2019</a:t>
+              <a:t>1/16/2019</a:t>
             </a:fld>
             <a:endParaRPr lang="en-US"/>
           </a:p>
@@ -7904,7 +10380,7 @@
           <a:p>
             <a:fld id="{CC52B196-69F7-5B49-9E8F-65111842FC39}" type="datetimeFigureOut">
               <a:rPr lang="en-US" smtClean="0"/>
-              <a:t>1/14/2019</a:t>
+              <a:t>1/16/2019</a:t>
             </a:fld>
             <a:endParaRPr lang="en-US"/>
           </a:p>
@@ -8045,7 +10521,7 @@
           <a:p>
             <a:fld id="{CC52B196-69F7-5B49-9E8F-65111842FC39}" type="datetimeFigureOut">
               <a:rPr lang="en-US" smtClean="0"/>
-              <a:t>1/14/2019</a:t>
+              <a:t>1/16/2019</a:t>
             </a:fld>
             <a:endParaRPr lang="en-US"/>
           </a:p>
@@ -8158,7 +10634,7 @@
           <a:p>
             <a:fld id="{CC52B196-69F7-5B49-9E8F-65111842FC39}" type="datetimeFigureOut">
               <a:rPr lang="en-US" smtClean="0"/>
-              <a:t>1/14/2019</a:t>
+              <a:t>1/16/2019</a:t>
             </a:fld>
             <a:endParaRPr lang="en-US"/>
           </a:p>
@@ -8469,7 +10945,7 @@
           <a:p>
             <a:fld id="{CC52B196-69F7-5B49-9E8F-65111842FC39}" type="datetimeFigureOut">
               <a:rPr lang="en-US" smtClean="0"/>
-              <a:t>1/14/2019</a:t>
+              <a:t>1/16/2019</a:t>
             </a:fld>
             <a:endParaRPr lang="en-US"/>
           </a:p>
@@ -8757,7 +11233,7 @@
           <a:p>
             <a:fld id="{CC52B196-69F7-5B49-9E8F-65111842FC39}" type="datetimeFigureOut">
               <a:rPr lang="en-US" smtClean="0"/>
-              <a:t>1/14/2019</a:t>
+              <a:t>1/16/2019</a:t>
             </a:fld>
             <a:endParaRPr lang="en-US"/>
           </a:p>
@@ -8998,7 +11474,7 @@
           <a:p>
             <a:fld id="{CC52B196-69F7-5B49-9E8F-65111842FC39}" type="datetimeFigureOut">
               <a:rPr lang="en-US" smtClean="0"/>
-              <a:t>1/14/2019</a:t>
+              <a:t>1/16/2019</a:t>
             </a:fld>
             <a:endParaRPr lang="en-US"/>
           </a:p>
@@ -11536,7 +14012,7 @@
             <p:ph idx="1"/>
             <p:extLst>
               <p:ext uri="{D42A27DB-BD31-4B8C-83A1-F6EECF244321}">
-                <p14:modId xmlns:p14="http://schemas.microsoft.com/office/powerpoint/2010/main" val="4081735421"/>
+                <p14:modId xmlns:p14="http://schemas.microsoft.com/office/powerpoint/2010/main" val="1394785288"/>
               </p:ext>
             </p:extLst>
           </p:nvPr>
@@ -12044,8 +14520,8 @@
         </p:blipFill>
         <p:spPr>
           <a:xfrm>
-            <a:off x="5075257" y="790317"/>
-            <a:ext cx="6553545" cy="4915158"/>
+            <a:off x="4773600" y="460377"/>
+            <a:ext cx="7370536" cy="5527901"/>
           </a:xfrm>
           <a:prstGeom prst="rect">
             <a:avLst/>
@@ -12241,8 +14717,8 @@
         </p:blipFill>
         <p:spPr>
           <a:xfrm>
-            <a:off x="5153822" y="975392"/>
-            <a:ext cx="6553545" cy="4915158"/>
+            <a:off x="4797442" y="426027"/>
+            <a:ext cx="7394558" cy="5545917"/>
           </a:xfrm>
           <a:prstGeom prst="rect">
             <a:avLst/>
@@ -12265,6 +14741,14 @@
 <file path=ppt/slides/slide9.xml><?xml version="1.0" encoding="utf-8"?>
 <p:sld xmlns:a="http://schemas.openxmlformats.org/drawingml/2006/main" xmlns:r="http://schemas.openxmlformats.org/officeDocument/2006/relationships" xmlns:p="http://schemas.openxmlformats.org/presentationml/2006/main">
   <p:cSld>
+    <p:bg>
+      <p:bgPr>
+        <a:solidFill>
+          <a:schemeClr val="bg1"/>
+        </a:solidFill>
+        <a:effectLst/>
+      </p:bgPr>
+    </p:bg>
     <p:spTree>
       <p:nvGrpSpPr>
         <p:cNvPr id="1" name=""/>
@@ -12281,6 +14765,98 @@
       </p:grpSpPr>
       <p:sp>
         <p:nvSpPr>
+          <p:cNvPr id="16" name="Rectangle 9">
+            <a:extLst>
+              <a:ext uri="{FF2B5EF4-FFF2-40B4-BE49-F238E27FC236}">
+                <a16:creationId xmlns:a16="http://schemas.microsoft.com/office/drawing/2014/main" id="{42A5316D-ED2F-4F89-B4B4-8D9240B1A348}"/>
+              </a:ext>
+              <a:ext uri="{C183D7F6-B498-43B3-948B-1728B52AA6E4}">
+                <adec:decorative xmlns:adec="http://schemas.microsoft.com/office/drawing/2017/decorative" val="1"/>
+              </a:ext>
+            </a:extLst>
+          </p:cNvPr>
+          <p:cNvSpPr>
+            <a:spLocks noGrp="1" noRot="1" noChangeAspect="1" noMove="1" noResize="1" noEditPoints="1" noAdjustHandles="1" noChangeArrowheads="1" noChangeShapeType="1" noTextEdit="1"/>
+          </p:cNvSpPr>
+          <p:nvPr>
+            <p:extLst>
+              <p:ext uri="{386F3935-93C4-4BCD-93E2-E3B085C9AB24}">
+                <p16:designElem xmlns:p16="http://schemas.microsoft.com/office/powerpoint/2015/main" val="1"/>
+              </p:ext>
+            </p:extLst>
+          </p:nvPr>
+        </p:nvSpPr>
+        <p:spPr>
+          <a:xfrm>
+            <a:off x="0" y="0"/>
+            <a:ext cx="2013557" cy="6858000"/>
+          </a:xfrm>
+          <a:prstGeom prst="rect">
+            <a:avLst/>
+          </a:prstGeom>
+          <a:solidFill>
+            <a:srgbClr val="7F7F7F"/>
+          </a:solidFill>
+          <a:ln>
+            <a:noFill/>
+          </a:ln>
+        </p:spPr>
+        <p:style>
+          <a:lnRef idx="2">
+            <a:schemeClr val="accent1">
+              <a:shade val="50000"/>
+            </a:schemeClr>
+          </a:lnRef>
+          <a:fillRef idx="1">
+            <a:schemeClr val="accent1"/>
+          </a:fillRef>
+          <a:effectRef idx="0">
+            <a:schemeClr val="accent1"/>
+          </a:effectRef>
+          <a:fontRef idx="minor">
+            <a:schemeClr val="lt1"/>
+          </a:fontRef>
+        </p:style>
+        <p:txBody>
+          <a:bodyPr rtlCol="0" anchor="ctr"/>
+          <a:lstStyle/>
+          <a:p>
+            <a:pPr marL="0" marR="0" lvl="0" indent="0" algn="ctr" defTabSz="457200" rtl="0" eaLnBrk="1" fontAlgn="auto" latinLnBrk="0" hangingPunct="1">
+              <a:lnSpc>
+                <a:spcPct val="100000"/>
+              </a:lnSpc>
+              <a:spcBef>
+                <a:spcPts val="0"/>
+              </a:spcBef>
+              <a:spcAft>
+                <a:spcPts val="0"/>
+              </a:spcAft>
+              <a:buClrTx/>
+              <a:buSzTx/>
+              <a:buFontTx/>
+              <a:buNone/>
+              <a:tabLst/>
+              <a:defRPr/>
+            </a:pPr>
+            <a:endParaRPr kumimoji="0" lang="en-US" sz="1800" b="0" i="0" u="none" strike="noStrike" kern="1200" cap="none" spc="0" normalizeH="0" baseline="0" noProof="0">
+              <a:ln>
+                <a:noFill/>
+              </a:ln>
+              <a:solidFill>
+                <a:prstClr val="white"/>
+              </a:solidFill>
+              <a:effectLst/>
+              <a:uLnTx/>
+              <a:uFillTx/>
+              <a:latin typeface="Calibri" panose="020F0502020204030204"/>
+              <a:ea typeface="+mn-ea"/>
+              <a:cs typeface="+mn-cs"/>
+            </a:endParaRPr>
+          </a:p>
+        </p:txBody>
+      </p:sp>
+      <p:sp>
+        <p:nvSpPr>
           <p:cNvPr id="2" name="Title 1">
             <a:extLst>
               <a:ext uri="{FF2B5EF4-FFF2-40B4-BE49-F238E27FC236}">
@@ -12295,43 +14871,72 @@
             <p:ph type="title"/>
           </p:nvPr>
         </p:nvSpPr>
-        <p:spPr/>
+        <p:spPr>
+          <a:xfrm>
+            <a:off x="838200" y="2057400"/>
+            <a:ext cx="2743200" cy="2743200"/>
+          </a:xfrm>
+          <a:prstGeom prst="ellipse">
+            <a:avLst/>
+          </a:prstGeom>
+          <a:solidFill>
+            <a:srgbClr val="262626"/>
+          </a:solidFill>
+          <a:ln w="174625" cmpd="thinThick">
+            <a:solidFill>
+              <a:srgbClr val="262626"/>
+            </a:solidFill>
+          </a:ln>
+        </p:spPr>
         <p:txBody>
-          <a:bodyPr/>
+          <a:bodyPr anchor="ctr">
+            <a:normAutofit/>
+          </a:bodyPr>
           <a:lstStyle/>
           <a:p>
+            <a:pPr algn="ctr"/>
             <a:r>
-              <a:rPr lang="en-US" dirty="0"/>
+              <a:rPr lang="en-US" sz="2600">
+                <a:solidFill>
+                  <a:srgbClr val="FFFFFF"/>
+                </a:solidFill>
+              </a:rPr>
               <a:t>Conclusion</a:t>
             </a:r>
           </a:p>
         </p:txBody>
       </p:sp>
-      <p:sp>
-        <p:nvSpPr>
-          <p:cNvPr id="3" name="Content Placeholder 2">
+      <p:graphicFrame>
+        <p:nvGraphicFramePr>
+          <p:cNvPr id="17" name="Content Placeholder 2">
             <a:extLst>
               <a:ext uri="{FF2B5EF4-FFF2-40B4-BE49-F238E27FC236}">
-                <a16:creationId xmlns:a16="http://schemas.microsoft.com/office/drawing/2014/main" id="{46E96450-CB86-B349-AC1A-0058857B2138}"/>
+                <a16:creationId xmlns:a16="http://schemas.microsoft.com/office/drawing/2014/main" id="{6DB7785C-03A4-4A3D-8F80-033635C443CE}"/>
               </a:ext>
             </a:extLst>
           </p:cNvPr>
-          <p:cNvSpPr>
-            <a:spLocks noGrp="1"/>
-          </p:cNvSpPr>
+          <p:cNvGraphicFramePr>
+            <a:graphicFrameLocks noGrp="1"/>
+          </p:cNvGraphicFramePr>
           <p:nvPr>
             <p:ph idx="1"/>
+            <p:extLst>
+              <p:ext uri="{D42A27DB-BD31-4B8C-83A1-F6EECF244321}">
+                <p14:modId xmlns:p14="http://schemas.microsoft.com/office/powerpoint/2010/main" val="2138612299"/>
+              </p:ext>
+            </p:extLst>
           </p:nvPr>
-        </p:nvSpPr>
-        <p:spPr/>
-        <p:txBody>
-          <a:bodyPr/>
-          <a:lstStyle/>
-          <a:p>
-            <a:endParaRPr lang="en-US" dirty="0"/>
-          </a:p>
-        </p:txBody>
-      </p:sp>
+        </p:nvGraphicFramePr>
+        <p:xfrm>
+          <a:off x="4038600" y="1166648"/>
+          <a:ext cx="7315200" cy="4524706"/>
+        </p:xfrm>
+        <a:graphic>
+          <a:graphicData uri="http://schemas.openxmlformats.org/drawingml/2006/diagram">
+            <dgm:relIds xmlns:dgm="http://schemas.openxmlformats.org/drawingml/2006/diagram" xmlns:r="http://schemas.openxmlformats.org/officeDocument/2006/relationships" r:dm="rId2" r:lo="rId3" r:qs="rId4" r:cs="rId5"/>
+          </a:graphicData>
+        </a:graphic>
+      </p:graphicFrame>
     </p:spTree>
     <p:extLst>
       <p:ext uri="{BB962C8B-B14F-4D97-AF65-F5344CB8AC3E}">

</xml_diff>